<commit_message>
Fix: Waterfalls not taking text fill colour from legend when no fill
Outstanding is issue when fill is set in template - not being
overwritten...
</commit_message>
<xml_diff>
--- a/McKinsey.PowerPointGenerator.App/Resources/PeTE demo.pptx
+++ b/McKinsey.PowerPointGenerator.App/Resources/PeTE demo.pptx
@@ -838,11 +838,11 @@
           <c:showBubbleSize val="0"/>
         </c:dLbls>
         <c:gapWidth val="247"/>
-        <c:axId val="-1173573264"/>
-        <c:axId val="-1173580336"/>
+        <c:axId val="1613685360"/>
+        <c:axId val="1613678832"/>
       </c:barChart>
       <c:catAx>
-        <c:axId val="-1173573264"/>
+        <c:axId val="1613685360"/>
         <c:scaling>
           <c:orientation val="maxMin"/>
         </c:scaling>
@@ -899,7 +899,7 @@
             <a:endParaRPr lang="de-DE"/>
           </a:p>
         </c:txPr>
-        <c:crossAx val="-1173580336"/>
+        <c:crossAx val="1613678832"/>
         <c:crosses val="autoZero"/>
         <c:auto val="1"/>
         <c:lblAlgn val="ctr"/>
@@ -907,7 +907,7 @@
         <c:noMultiLvlLbl val="0"/>
       </c:catAx>
       <c:valAx>
-        <c:axId val="-1173580336"/>
+        <c:axId val="1613678832"/>
         <c:scaling>
           <c:orientation val="minMax"/>
         </c:scaling>
@@ -958,7 +958,7 @@
             <a:endParaRPr lang="de-DE"/>
           </a:p>
         </c:txPr>
-        <c:crossAx val="-1173573264"/>
+        <c:crossAx val="1613685360"/>
         <c:crosses val="autoZero"/>
         <c:crossBetween val="between"/>
       </c:valAx>
@@ -1130,7 +1130,6 @@
             <c:showLeaderLines val="0"/>
             <c:extLst>
               <c:ext xmlns:c15="http://schemas.microsoft.com/office/drawing/2012/chart" uri="{CE6537A1-D6FC-4f65-9D91-7224C49458BB}">
-                <c15:layout/>
                 <c15:showLeaderLines val="1"/>
                 <c15:leaderLines>
                   <c:spPr>
@@ -1215,11 +1214,11 @@
             <a:effectLst/>
           </c:spPr>
         </c:serLines>
-        <c:axId val="-1173556944"/>
-        <c:axId val="-1173558576"/>
+        <c:axId val="1512028928"/>
+        <c:axId val="1512026752"/>
       </c:barChart>
       <c:catAx>
-        <c:axId val="-1173556944"/>
+        <c:axId val="1512028928"/>
         <c:scaling>
           <c:orientation val="minMax"/>
         </c:scaling>
@@ -1262,7 +1261,7 @@
             <a:endParaRPr lang="de-DE"/>
           </a:p>
         </c:txPr>
-        <c:crossAx val="-1173558576"/>
+        <c:crossAx val="1512026752"/>
         <c:crosses val="autoZero"/>
         <c:auto val="1"/>
         <c:lblAlgn val="ctr"/>
@@ -1270,7 +1269,7 @@
         <c:noMultiLvlLbl val="0"/>
       </c:catAx>
       <c:valAx>
-        <c:axId val="-1173558576"/>
+        <c:axId val="1512026752"/>
         <c:scaling>
           <c:orientation val="minMax"/>
         </c:scaling>
@@ -1308,7 +1307,7 @@
             <a:endParaRPr lang="de-DE"/>
           </a:p>
         </c:txPr>
-        <c:crossAx val="-1173556944"/>
+        <c:crossAx val="1512028928"/>
         <c:crosses val="autoZero"/>
         <c:crossBetween val="between"/>
       </c:valAx>
@@ -1473,11 +1472,11 @@
           <c:showPercent val="0"/>
           <c:showBubbleSize val="0"/>
         </c:dLbls>
-        <c:axId val="-1173561296"/>
-        <c:axId val="-1173559664"/>
+        <c:axId val="1512023488"/>
+        <c:axId val="1741871664"/>
       </c:scatterChart>
       <c:valAx>
-        <c:axId val="-1173561296"/>
+        <c:axId val="1512023488"/>
         <c:scaling>
           <c:orientation val="minMax"/>
           <c:max val="180"/>
@@ -1512,12 +1511,12 @@
             <a:endParaRPr lang="de-DE"/>
           </a:p>
         </c:txPr>
-        <c:crossAx val="-1173559664"/>
+        <c:crossAx val="1741871664"/>
         <c:crosses val="autoZero"/>
         <c:crossBetween val="midCat"/>
       </c:valAx>
       <c:valAx>
-        <c:axId val="-1173559664"/>
+        <c:axId val="1741871664"/>
         <c:scaling>
           <c:orientation val="minMax"/>
           <c:max val="85"/>
@@ -1552,7 +1551,7 @@
             <a:endParaRPr lang="de-DE"/>
           </a:p>
         </c:txPr>
-        <c:crossAx val="-1173561296"/>
+        <c:crossAx val="1512023488"/>
         <c:crosses val="autoZero"/>
         <c:crossBetween val="midCat"/>
       </c:valAx>
@@ -1837,11 +1836,11 @@
           <c:showPercent val="0"/>
           <c:showBubbleSize val="0"/>
         </c:dLbls>
-        <c:axId val="-1173555312"/>
-        <c:axId val="-1173553680"/>
+        <c:axId val="1741872208"/>
+        <c:axId val="1741868944"/>
       </c:scatterChart>
       <c:valAx>
-        <c:axId val="-1173555312"/>
+        <c:axId val="1741872208"/>
         <c:scaling>
           <c:orientation val="minMax"/>
           <c:max val="5"/>
@@ -1895,13 +1894,13 @@
             <a:endParaRPr lang="de-DE"/>
           </a:p>
         </c:txPr>
-        <c:crossAx val="-1173553680"/>
+        <c:crossAx val="1741868944"/>
         <c:crosses val="autoZero"/>
         <c:crossBetween val="midCat"/>
         <c:majorUnit val="1"/>
       </c:valAx>
       <c:valAx>
-        <c:axId val="-1173553680"/>
+        <c:axId val="1741868944"/>
         <c:scaling>
           <c:orientation val="maxMin"/>
           <c:max val="10.5"/>
@@ -1946,7 +1945,7 @@
             <a:endParaRPr lang="de-DE"/>
           </a:p>
         </c:txPr>
-        <c:crossAx val="-1173555312"/>
+        <c:crossAx val="1741872208"/>
         <c:crosses val="autoZero"/>
         <c:crossBetween val="midCat"/>
       </c:valAx>
@@ -2231,11 +2230,11 @@
           <c:showBubbleSize val="0"/>
         </c:dLbls>
         <c:gapWidth val="247"/>
-        <c:axId val="-1173570000"/>
-        <c:axId val="-1173583056"/>
+        <c:axId val="1613682640"/>
+        <c:axId val="1358880864"/>
       </c:barChart>
       <c:catAx>
-        <c:axId val="-1173570000"/>
+        <c:axId val="1613682640"/>
         <c:scaling>
           <c:orientation val="minMax"/>
         </c:scaling>
@@ -2292,7 +2291,7 @@
             <a:endParaRPr lang="de-DE"/>
           </a:p>
         </c:txPr>
-        <c:crossAx val="-1173583056"/>
+        <c:crossAx val="1358880864"/>
         <c:crosses val="autoZero"/>
         <c:auto val="1"/>
         <c:lblAlgn val="ctr"/>
@@ -2300,7 +2299,7 @@
         <c:noMultiLvlLbl val="0"/>
       </c:catAx>
       <c:valAx>
-        <c:axId val="-1173583056"/>
+        <c:axId val="1358880864"/>
         <c:scaling>
           <c:orientation val="minMax"/>
         </c:scaling>
@@ -2351,7 +2350,7 @@
             <a:endParaRPr lang="de-DE"/>
           </a:p>
         </c:txPr>
-        <c:crossAx val="-1173570000"/>
+        <c:crossAx val="1613682640"/>
         <c:crosses val="autoZero"/>
         <c:crossBetween val="between"/>
       </c:valAx>
@@ -2685,11 +2684,11 @@
           <c:showBubbleSize val="0"/>
         </c:dLbls>
         <c:gapWidth val="247"/>
-        <c:axId val="-1173568912"/>
-        <c:axId val="-1173570544"/>
+        <c:axId val="1358883040"/>
+        <c:axId val="1358881952"/>
       </c:barChart>
       <c:catAx>
-        <c:axId val="-1173568912"/>
+        <c:axId val="1358883040"/>
         <c:scaling>
           <c:orientation val="minMax"/>
         </c:scaling>
@@ -2746,7 +2745,7 @@
             <a:endParaRPr lang="de-DE"/>
           </a:p>
         </c:txPr>
-        <c:crossAx val="-1173570544"/>
+        <c:crossAx val="1358881952"/>
         <c:crosses val="autoZero"/>
         <c:auto val="1"/>
         <c:lblAlgn val="ctr"/>
@@ -2754,7 +2753,7 @@
         <c:noMultiLvlLbl val="0"/>
       </c:catAx>
       <c:valAx>
-        <c:axId val="-1173570544"/>
+        <c:axId val="1358881952"/>
         <c:scaling>
           <c:orientation val="minMax"/>
         </c:scaling>
@@ -2805,7 +2804,7 @@
             <a:endParaRPr lang="de-DE"/>
           </a:p>
         </c:txPr>
-        <c:crossAx val="-1173568912"/>
+        <c:crossAx val="1358883040"/>
         <c:crosses val="autoZero"/>
         <c:crossBetween val="between"/>
       </c:valAx>
@@ -3041,11 +3040,11 @@
         </c:dLbls>
         <c:gapWidth val="219"/>
         <c:overlap val="-27"/>
-        <c:axId val="-1173569456"/>
-        <c:axId val="-1173568368"/>
+        <c:axId val="1358883584"/>
+        <c:axId val="1049390800"/>
       </c:barChart>
       <c:catAx>
-        <c:axId val="-1173569456"/>
+        <c:axId val="1358883584"/>
         <c:scaling>
           <c:orientation val="minMax"/>
         </c:scaling>
@@ -3088,7 +3087,7 @@
             <a:endParaRPr lang="de-DE"/>
           </a:p>
         </c:txPr>
-        <c:crossAx val="-1173568368"/>
+        <c:crossAx val="1049390800"/>
         <c:crosses val="autoZero"/>
         <c:auto val="1"/>
         <c:lblAlgn val="ctr"/>
@@ -3096,7 +3095,7 @@
         <c:noMultiLvlLbl val="0"/>
       </c:catAx>
       <c:valAx>
-        <c:axId val="-1173568368"/>
+        <c:axId val="1049390800"/>
         <c:scaling>
           <c:orientation val="minMax"/>
         </c:scaling>
@@ -3147,7 +3146,7 @@
             <a:endParaRPr lang="de-DE"/>
           </a:p>
         </c:txPr>
-        <c:crossAx val="-1173569456"/>
+        <c:crossAx val="1358883584"/>
         <c:crosses val="autoZero"/>
         <c:crossBetween val="between"/>
       </c:valAx>
@@ -3364,11 +3363,11 @@
           <c:showBubbleSize val="0"/>
         </c:dLbls>
         <c:gapWidth val="182"/>
-        <c:axId val="-1173567280"/>
-        <c:axId val="-1173583600"/>
+        <c:axId val="1610585504"/>
+        <c:axId val="1610583872"/>
       </c:barChart>
       <c:catAx>
-        <c:axId val="-1173567280"/>
+        <c:axId val="1610585504"/>
         <c:scaling>
           <c:orientation val="minMax"/>
         </c:scaling>
@@ -3411,7 +3410,7 @@
             <a:endParaRPr lang="de-DE"/>
           </a:p>
         </c:txPr>
-        <c:crossAx val="-1173583600"/>
+        <c:crossAx val="1610583872"/>
         <c:crosses val="autoZero"/>
         <c:auto val="1"/>
         <c:lblAlgn val="ctr"/>
@@ -3419,7 +3418,7 @@
         <c:noMultiLvlLbl val="0"/>
       </c:catAx>
       <c:valAx>
-        <c:axId val="-1173583600"/>
+        <c:axId val="1610583872"/>
         <c:scaling>
           <c:orientation val="minMax"/>
         </c:scaling>
@@ -3470,7 +3469,7 @@
             <a:endParaRPr lang="de-DE"/>
           </a:p>
         </c:txPr>
-        <c:crossAx val="-1173567280"/>
+        <c:crossAx val="1610585504"/>
         <c:crosses val="autoZero"/>
         <c:crossBetween val="between"/>
       </c:valAx>
@@ -3756,11 +3755,11 @@
         </c:dLbls>
         <c:gapWidth val="219"/>
         <c:overlap val="100"/>
-        <c:axId val="-1173565104"/>
-        <c:axId val="-1173566192"/>
+        <c:axId val="1610580608"/>
+        <c:axId val="1610584416"/>
       </c:barChart>
       <c:catAx>
-        <c:axId val="-1173565104"/>
+        <c:axId val="1610580608"/>
         <c:scaling>
           <c:orientation val="minMax"/>
         </c:scaling>
@@ -3803,7 +3802,7 @@
             <a:endParaRPr lang="de-DE"/>
           </a:p>
         </c:txPr>
-        <c:crossAx val="-1173566192"/>
+        <c:crossAx val="1610584416"/>
         <c:crosses val="autoZero"/>
         <c:auto val="1"/>
         <c:lblAlgn val="ctr"/>
@@ -3811,7 +3810,7 @@
         <c:noMultiLvlLbl val="0"/>
       </c:catAx>
       <c:valAx>
-        <c:axId val="-1173566192"/>
+        <c:axId val="1610584416"/>
         <c:scaling>
           <c:orientation val="minMax"/>
         </c:scaling>
@@ -3862,7 +3861,7 @@
             <a:endParaRPr lang="de-DE"/>
           </a:p>
         </c:txPr>
-        <c:crossAx val="-1173565104"/>
+        <c:crossAx val="1610580608"/>
         <c:crosses val="autoZero"/>
         <c:crossBetween val="between"/>
       </c:valAx>
@@ -4058,11 +4057,11 @@
         </c:dLbls>
         <c:gapWidth val="100"/>
         <c:overlap val="-24"/>
-        <c:axId val="-1173562928"/>
-        <c:axId val="-1173562384"/>
+        <c:axId val="1610586592"/>
+        <c:axId val="1610581152"/>
       </c:barChart>
       <c:catAx>
-        <c:axId val="-1173562928"/>
+        <c:axId val="1610586592"/>
         <c:scaling>
           <c:orientation val="minMax"/>
         </c:scaling>
@@ -4102,7 +4101,7 @@
             <a:endParaRPr lang="de-DE"/>
           </a:p>
         </c:txPr>
-        <c:crossAx val="-1173562384"/>
+        <c:crossAx val="1610581152"/>
         <c:crosses val="autoZero"/>
         <c:auto val="1"/>
         <c:lblAlgn val="ctr"/>
@@ -4110,7 +4109,7 @@
         <c:noMultiLvlLbl val="0"/>
       </c:catAx>
       <c:valAx>
-        <c:axId val="-1173562384"/>
+        <c:axId val="1610581152"/>
         <c:scaling>
           <c:orientation val="minMax"/>
         </c:scaling>
@@ -4158,7 +4157,7 @@
             <a:endParaRPr lang="de-DE"/>
           </a:p>
         </c:txPr>
-        <c:crossAx val="-1173562928"/>
+        <c:crossAx val="1610586592"/>
         <c:crosses val="autoZero"/>
         <c:crossBetween val="between"/>
       </c:valAx>
@@ -4285,11 +4284,11 @@
         </c:dLbls>
         <c:gapWidth val="100"/>
         <c:overlap val="-24"/>
-        <c:axId val="-1173560208"/>
-        <c:axId val="-1173558032"/>
+        <c:axId val="1512027296"/>
+        <c:axId val="1512024576"/>
       </c:barChart>
       <c:catAx>
-        <c:axId val="-1173560208"/>
+        <c:axId val="1512027296"/>
         <c:scaling>
           <c:orientation val="minMax"/>
         </c:scaling>
@@ -4329,7 +4328,7 @@
             <a:endParaRPr lang="de-DE"/>
           </a:p>
         </c:txPr>
-        <c:crossAx val="-1173558032"/>
+        <c:crossAx val="1512024576"/>
         <c:crosses val="autoZero"/>
         <c:auto val="1"/>
         <c:lblAlgn val="ctr"/>
@@ -4337,7 +4336,7 @@
         <c:noMultiLvlLbl val="0"/>
       </c:catAx>
       <c:valAx>
-        <c:axId val="-1173558032"/>
+        <c:axId val="1512024576"/>
         <c:scaling>
           <c:orientation val="minMax"/>
         </c:scaling>
@@ -4385,7 +4384,7 @@
             <a:endParaRPr lang="de-DE"/>
           </a:p>
         </c:txPr>
-        <c:crossAx val="-1173560208"/>
+        <c:crossAx val="1512027296"/>
         <c:crosses val="autoZero"/>
         <c:crossBetween val="between"/>
       </c:valAx>
@@ -4585,11 +4584,11 @@
         </c:dLbls>
         <c:gapWidth val="100"/>
         <c:overlap val="-24"/>
-        <c:axId val="-1173555856"/>
-        <c:axId val="-1173557488"/>
+        <c:axId val="1512025120"/>
+        <c:axId val="1512022400"/>
       </c:barChart>
       <c:catAx>
-        <c:axId val="-1173555856"/>
+        <c:axId val="1512025120"/>
         <c:scaling>
           <c:orientation val="minMax"/>
         </c:scaling>
@@ -4629,7 +4628,7 @@
             <a:endParaRPr lang="de-DE"/>
           </a:p>
         </c:txPr>
-        <c:crossAx val="-1173557488"/>
+        <c:crossAx val="1512022400"/>
         <c:crosses val="autoZero"/>
         <c:auto val="1"/>
         <c:lblAlgn val="ctr"/>
@@ -4637,7 +4636,7 @@
         <c:noMultiLvlLbl val="0"/>
       </c:catAx>
       <c:valAx>
-        <c:axId val="-1173557488"/>
+        <c:axId val="1512022400"/>
         <c:scaling>
           <c:orientation val="minMax"/>
         </c:scaling>
@@ -4685,7 +4684,7 @@
             <a:endParaRPr lang="de-DE"/>
           </a:p>
         </c:txPr>
-        <c:crossAx val="-1173555856"/>
+        <c:crossAx val="1512025120"/>
         <c:crosses val="autoZero"/>
         <c:crossBetween val="between"/>
       </c:valAx>
@@ -11365,7 +11364,7 @@
           <a:p>
             <a:fld id="{CDDF8AD2-EB53-48AB-A5A7-109F783CF5C6}" type="datetimeFigureOut">
               <a:rPr lang="en-US" smtClean="0"/>
-              <a:t>6/30/2016</a:t>
+              <a:t>7/3/2016</a:t>
             </a:fld>
             <a:endParaRPr lang="en-US"/>
           </a:p>
@@ -13615,7 +13614,7 @@
 </file>
 
 <file path=ppt/slides/slide1.xml><?xml version="1.0" encoding="utf-8"?>
-<p:sld xmlns:a="http://schemas.openxmlformats.org/drawingml/2006/main" xmlns:r="http://schemas.openxmlformats.org/officeDocument/2006/relationships" xmlns:p="http://schemas.openxmlformats.org/presentationml/2006/main" show="0">
+<p:sld xmlns:a="http://schemas.openxmlformats.org/drawingml/2006/main" xmlns:r="http://schemas.openxmlformats.org/officeDocument/2006/relationships" xmlns:p="http://schemas.openxmlformats.org/presentationml/2006/main">
   <p:cSld>
     <p:spTree>
       <p:nvGrpSpPr>
@@ -13866,11 +13865,11 @@
   <p:clrMapOvr>
     <a:masterClrMapping/>
   </p:clrMapOvr>
-  <mc:AlternateContent xmlns:mc="http://schemas.openxmlformats.org/markup-compatibility/2006" xmlns:p14="http://schemas.microsoft.com/office/powerpoint/2010/main">
-    <mc:Choice Requires="p14">
+  <mc:AlternateContent xmlns:mc="http://schemas.openxmlformats.org/markup-compatibility/2006">
+    <mc:Choice xmlns:p14="http://schemas.microsoft.com/office/powerpoint/2010/main" Requires="p14">
       <p:transition spd="slow" p14:dur="2000"/>
     </mc:Choice>
-    <mc:Fallback xmlns="">
+    <mc:Fallback>
       <p:transition spd="slow"/>
     </mc:Fallback>
   </mc:AlternateContent>
@@ -13885,7 +13884,7 @@
 </file>
 
 <file path=ppt/slides/slide10.xml><?xml version="1.0" encoding="utf-8"?>
-<p:sld xmlns:a="http://schemas.openxmlformats.org/drawingml/2006/main" xmlns:r="http://schemas.openxmlformats.org/officeDocument/2006/relationships" xmlns:p="http://schemas.openxmlformats.org/presentationml/2006/main" show="0">
+<p:sld xmlns:a="http://schemas.openxmlformats.org/drawingml/2006/main" xmlns:r="http://schemas.openxmlformats.org/officeDocument/2006/relationships" xmlns:p="http://schemas.openxmlformats.org/presentationml/2006/main">
   <p:cSld>
     <p:spTree>
       <p:nvGrpSpPr>
@@ -13957,11 +13956,11 @@
   <p:clrMapOvr>
     <a:masterClrMapping/>
   </p:clrMapOvr>
-  <mc:AlternateContent xmlns:mc="http://schemas.openxmlformats.org/markup-compatibility/2006" xmlns:p14="http://schemas.microsoft.com/office/powerpoint/2010/main">
-    <mc:Choice Requires="p14">
+  <mc:AlternateContent xmlns:mc="http://schemas.openxmlformats.org/markup-compatibility/2006">
+    <mc:Choice xmlns:p14="http://schemas.microsoft.com/office/powerpoint/2010/main" Requires="p14">
       <p:transition spd="slow" p14:dur="2000"/>
     </mc:Choice>
-    <mc:Fallback xmlns="">
+    <mc:Fallback>
       <p:transition spd="slow"/>
     </mc:Fallback>
   </mc:AlternateContent>
@@ -13976,7 +13975,7 @@
 </file>
 
 <file path=ppt/slides/slide11.xml><?xml version="1.0" encoding="utf-8"?>
-<p:sld xmlns:a="http://schemas.openxmlformats.org/drawingml/2006/main" xmlns:r="http://schemas.openxmlformats.org/officeDocument/2006/relationships" xmlns:p="http://schemas.openxmlformats.org/presentationml/2006/main" show="0">
+<p:sld xmlns:a="http://schemas.openxmlformats.org/drawingml/2006/main" xmlns:r="http://schemas.openxmlformats.org/officeDocument/2006/relationships" xmlns:p="http://schemas.openxmlformats.org/presentationml/2006/main">
   <p:cSld>
     <p:spTree>
       <p:nvGrpSpPr>
@@ -14211,11 +14210,11 @@
   <p:clrMapOvr>
     <a:masterClrMapping/>
   </p:clrMapOvr>
-  <mc:AlternateContent xmlns:mc="http://schemas.openxmlformats.org/markup-compatibility/2006" xmlns:p14="http://schemas.microsoft.com/office/powerpoint/2010/main">
-    <mc:Choice Requires="p14">
+  <mc:AlternateContent xmlns:mc="http://schemas.openxmlformats.org/markup-compatibility/2006">
+    <mc:Choice xmlns:p14="http://schemas.microsoft.com/office/powerpoint/2010/main" Requires="p14">
       <p:transition spd="slow" p14:dur="2000"/>
     </mc:Choice>
-    <mc:Fallback xmlns="">
+    <mc:Fallback>
       <p:transition spd="slow"/>
     </mc:Fallback>
   </mc:AlternateContent>
@@ -14230,7 +14229,7 @@
 </file>
 
 <file path=ppt/slides/slide12.xml><?xml version="1.0" encoding="utf-8"?>
-<p:sld xmlns:a="http://schemas.openxmlformats.org/drawingml/2006/main" xmlns:r="http://schemas.openxmlformats.org/officeDocument/2006/relationships" xmlns:p="http://schemas.openxmlformats.org/presentationml/2006/main" show="0">
+<p:sld xmlns:a="http://schemas.openxmlformats.org/drawingml/2006/main" xmlns:r="http://schemas.openxmlformats.org/officeDocument/2006/relationships" xmlns:p="http://schemas.openxmlformats.org/presentationml/2006/main">
   <p:cSld>
     <p:spTree>
       <p:nvGrpSpPr>
@@ -14439,11 +14438,11 @@
   <p:clrMapOvr>
     <a:masterClrMapping/>
   </p:clrMapOvr>
-  <mc:AlternateContent xmlns:mc="http://schemas.openxmlformats.org/markup-compatibility/2006" xmlns:p14="http://schemas.microsoft.com/office/powerpoint/2010/main">
-    <mc:Choice Requires="p14">
+  <mc:AlternateContent xmlns:mc="http://schemas.openxmlformats.org/markup-compatibility/2006">
+    <mc:Choice xmlns:p14="http://schemas.microsoft.com/office/powerpoint/2010/main" Requires="p14">
       <p:transition spd="slow" p14:dur="2000"/>
     </mc:Choice>
-    <mc:Fallback xmlns="">
+    <mc:Fallback>
       <p:transition spd="slow"/>
     </mc:Fallback>
   </mc:AlternateContent>
@@ -14458,7 +14457,7 @@
 </file>
 
 <file path=ppt/slides/slide13.xml><?xml version="1.0" encoding="utf-8"?>
-<p:sld xmlns:a="http://schemas.openxmlformats.org/drawingml/2006/main" xmlns:r="http://schemas.openxmlformats.org/officeDocument/2006/relationships" xmlns:p="http://schemas.openxmlformats.org/presentationml/2006/main" show="0">
+<p:sld xmlns:a="http://schemas.openxmlformats.org/drawingml/2006/main" xmlns:r="http://schemas.openxmlformats.org/officeDocument/2006/relationships" xmlns:p="http://schemas.openxmlformats.org/presentationml/2006/main">
   <p:cSld>
     <p:spTree>
       <p:nvGrpSpPr>
@@ -14865,11 +14864,11 @@
   <p:clrMapOvr>
     <a:masterClrMapping/>
   </p:clrMapOvr>
-  <mc:AlternateContent xmlns:mc="http://schemas.openxmlformats.org/markup-compatibility/2006" xmlns:p14="http://schemas.microsoft.com/office/powerpoint/2010/main">
-    <mc:Choice Requires="p14">
+  <mc:AlternateContent xmlns:mc="http://schemas.openxmlformats.org/markup-compatibility/2006">
+    <mc:Choice xmlns:p14="http://schemas.microsoft.com/office/powerpoint/2010/main" Requires="p14">
       <p:transition spd="slow" p14:dur="2000"/>
     </mc:Choice>
-    <mc:Fallback xmlns="">
+    <mc:Fallback>
       <p:transition spd="slow"/>
     </mc:Fallback>
   </mc:AlternateContent>
@@ -14884,7 +14883,7 @@
 </file>
 
 <file path=ppt/slides/slide14.xml><?xml version="1.0" encoding="utf-8"?>
-<p:sld xmlns:a="http://schemas.openxmlformats.org/drawingml/2006/main" xmlns:r="http://schemas.openxmlformats.org/officeDocument/2006/relationships" xmlns:p="http://schemas.openxmlformats.org/presentationml/2006/main" show="0">
+<p:sld xmlns:a="http://schemas.openxmlformats.org/drawingml/2006/main" xmlns:r="http://schemas.openxmlformats.org/officeDocument/2006/relationships" xmlns:p="http://schemas.openxmlformats.org/presentationml/2006/main">
   <p:cSld>
     <p:spTree>
       <p:nvGrpSpPr>
@@ -15125,11 +15124,11 @@
   <p:clrMapOvr>
     <a:masterClrMapping/>
   </p:clrMapOvr>
-  <mc:AlternateContent xmlns:mc="http://schemas.openxmlformats.org/markup-compatibility/2006" xmlns:p14="http://schemas.microsoft.com/office/powerpoint/2010/main">
-    <mc:Choice Requires="p14">
+  <mc:AlternateContent xmlns:mc="http://schemas.openxmlformats.org/markup-compatibility/2006">
+    <mc:Choice xmlns:p14="http://schemas.microsoft.com/office/powerpoint/2010/main" Requires="p14">
       <p:transition spd="slow" p14:dur="2000"/>
     </mc:Choice>
-    <mc:Fallback xmlns="">
+    <mc:Fallback>
       <p:transition spd="slow"/>
     </mc:Fallback>
   </mc:AlternateContent>
@@ -15144,7 +15143,7 @@
 </file>
 
 <file path=ppt/slides/slide15.xml><?xml version="1.0" encoding="utf-8"?>
-<p:sld xmlns:a="http://schemas.openxmlformats.org/drawingml/2006/main" xmlns:r="http://schemas.openxmlformats.org/officeDocument/2006/relationships" xmlns:p="http://schemas.openxmlformats.org/presentationml/2006/main" show="0">
+<p:sld xmlns:a="http://schemas.openxmlformats.org/drawingml/2006/main" xmlns:r="http://schemas.openxmlformats.org/officeDocument/2006/relationships" xmlns:p="http://schemas.openxmlformats.org/presentationml/2006/main">
   <p:cSld>
     <p:spTree>
       <p:nvGrpSpPr>
@@ -15324,11 +15323,11 @@
   <p:clrMapOvr>
     <a:masterClrMapping/>
   </p:clrMapOvr>
-  <mc:AlternateContent xmlns:mc="http://schemas.openxmlformats.org/markup-compatibility/2006" xmlns:p14="http://schemas.microsoft.com/office/powerpoint/2010/main">
-    <mc:Choice Requires="p14">
+  <mc:AlternateContent xmlns:mc="http://schemas.openxmlformats.org/markup-compatibility/2006">
+    <mc:Choice xmlns:p14="http://schemas.microsoft.com/office/powerpoint/2010/main" Requires="p14">
       <p:transition spd="slow" p14:dur="2000"/>
     </mc:Choice>
-    <mc:Fallback xmlns="">
+    <mc:Fallback>
       <p:transition spd="slow"/>
     </mc:Fallback>
   </mc:AlternateContent>
@@ -15343,7 +15342,7 @@
 </file>
 
 <file path=ppt/slides/slide16.xml><?xml version="1.0" encoding="utf-8"?>
-<p:sld xmlns:a="http://schemas.openxmlformats.org/drawingml/2006/main" xmlns:r="http://schemas.openxmlformats.org/officeDocument/2006/relationships" xmlns:p="http://schemas.openxmlformats.org/presentationml/2006/main" show="0">
+<p:sld xmlns:a="http://schemas.openxmlformats.org/drawingml/2006/main" xmlns:r="http://schemas.openxmlformats.org/officeDocument/2006/relationships" xmlns:p="http://schemas.openxmlformats.org/presentationml/2006/main">
   <p:cSld>
     <p:spTree>
       <p:nvGrpSpPr>
@@ -15549,11 +15548,11 @@
   <p:clrMapOvr>
     <a:masterClrMapping/>
   </p:clrMapOvr>
-  <mc:AlternateContent xmlns:mc="http://schemas.openxmlformats.org/markup-compatibility/2006" xmlns:p14="http://schemas.microsoft.com/office/powerpoint/2010/main">
-    <mc:Choice Requires="p14">
+  <mc:AlternateContent xmlns:mc="http://schemas.openxmlformats.org/markup-compatibility/2006">
+    <mc:Choice xmlns:p14="http://schemas.microsoft.com/office/powerpoint/2010/main" Requires="p14">
       <p:transition spd="slow" p14:dur="2000"/>
     </mc:Choice>
-    <mc:Fallback xmlns="">
+    <mc:Fallback>
       <p:transition spd="slow"/>
     </mc:Fallback>
   </mc:AlternateContent>
@@ -15568,7 +15567,7 @@
 </file>
 
 <file path=ppt/slides/slide17.xml><?xml version="1.0" encoding="utf-8"?>
-<p:sld xmlns:a="http://schemas.openxmlformats.org/drawingml/2006/main" xmlns:r="http://schemas.openxmlformats.org/officeDocument/2006/relationships" xmlns:p="http://schemas.openxmlformats.org/presentationml/2006/main" show="0">
+<p:sld xmlns:a="http://schemas.openxmlformats.org/drawingml/2006/main" xmlns:r="http://schemas.openxmlformats.org/officeDocument/2006/relationships" xmlns:p="http://schemas.openxmlformats.org/presentationml/2006/main">
   <p:cSld>
     <p:spTree>
       <p:nvGrpSpPr>
@@ -15752,11 +15751,11 @@
   <p:clrMapOvr>
     <a:masterClrMapping/>
   </p:clrMapOvr>
-  <mc:AlternateContent xmlns:mc="http://schemas.openxmlformats.org/markup-compatibility/2006" xmlns:p14="http://schemas.microsoft.com/office/powerpoint/2010/main">
-    <mc:Choice Requires="p14">
+  <mc:AlternateContent xmlns:mc="http://schemas.openxmlformats.org/markup-compatibility/2006">
+    <mc:Choice xmlns:p14="http://schemas.microsoft.com/office/powerpoint/2010/main" Requires="p14">
       <p:transition spd="slow" p14:dur="2000"/>
     </mc:Choice>
-    <mc:Fallback xmlns="">
+    <mc:Fallback>
       <p:transition spd="slow"/>
     </mc:Fallback>
   </mc:AlternateContent>
@@ -15771,7 +15770,7 @@
 </file>
 
 <file path=ppt/slides/slide18.xml><?xml version="1.0" encoding="utf-8"?>
-<p:sld xmlns:a="http://schemas.openxmlformats.org/drawingml/2006/main" xmlns:r="http://schemas.openxmlformats.org/officeDocument/2006/relationships" xmlns:p="http://schemas.openxmlformats.org/presentationml/2006/main" show="0">
+<p:sld xmlns:a="http://schemas.openxmlformats.org/drawingml/2006/main" xmlns:r="http://schemas.openxmlformats.org/officeDocument/2006/relationships" xmlns:p="http://schemas.openxmlformats.org/presentationml/2006/main">
   <p:cSld>
     <p:spTree>
       <p:nvGrpSpPr>
@@ -16003,11 +16002,11 @@
   <p:clrMapOvr>
     <a:masterClrMapping/>
   </p:clrMapOvr>
-  <mc:AlternateContent xmlns:mc="http://schemas.openxmlformats.org/markup-compatibility/2006" xmlns:p14="http://schemas.microsoft.com/office/powerpoint/2010/main">
-    <mc:Choice Requires="p14">
+  <mc:AlternateContent xmlns:mc="http://schemas.openxmlformats.org/markup-compatibility/2006">
+    <mc:Choice xmlns:p14="http://schemas.microsoft.com/office/powerpoint/2010/main" Requires="p14">
       <p:transition spd="slow" p14:dur="2000"/>
     </mc:Choice>
-    <mc:Fallback xmlns="">
+    <mc:Fallback>
       <p:transition spd="slow"/>
     </mc:Fallback>
   </mc:AlternateContent>
@@ -16022,7 +16021,7 @@
 </file>
 
 <file path=ppt/slides/slide19.xml><?xml version="1.0" encoding="utf-8"?>
-<p:sld xmlns:a="http://schemas.openxmlformats.org/drawingml/2006/main" xmlns:r="http://schemas.openxmlformats.org/officeDocument/2006/relationships" xmlns:p="http://schemas.openxmlformats.org/presentationml/2006/main" show="0">
+<p:sld xmlns:a="http://schemas.openxmlformats.org/drawingml/2006/main" xmlns:r="http://schemas.openxmlformats.org/officeDocument/2006/relationships" xmlns:p="http://schemas.openxmlformats.org/presentationml/2006/main">
   <p:cSld>
     <p:spTree>
       <p:nvGrpSpPr>
@@ -16650,11 +16649,11 @@
   <p:clrMapOvr>
     <a:masterClrMapping/>
   </p:clrMapOvr>
-  <mc:AlternateContent xmlns:mc="http://schemas.openxmlformats.org/markup-compatibility/2006" xmlns:p14="http://schemas.microsoft.com/office/powerpoint/2010/main">
-    <mc:Choice Requires="p14">
+  <mc:AlternateContent xmlns:mc="http://schemas.openxmlformats.org/markup-compatibility/2006">
+    <mc:Choice xmlns:p14="http://schemas.microsoft.com/office/powerpoint/2010/main" Requires="p14">
       <p:transition spd="slow" p14:dur="2000"/>
     </mc:Choice>
-    <mc:Fallback xmlns="">
+    <mc:Fallback>
       <p:transition spd="slow"/>
     </mc:Fallback>
   </mc:AlternateContent>
@@ -16669,7 +16668,7 @@
 </file>
 
 <file path=ppt/slides/slide2.xml><?xml version="1.0" encoding="utf-8"?>
-<p:sld xmlns:a="http://schemas.openxmlformats.org/drawingml/2006/main" xmlns:r="http://schemas.openxmlformats.org/officeDocument/2006/relationships" xmlns:p="http://schemas.openxmlformats.org/presentationml/2006/main" show="0">
+<p:sld xmlns:a="http://schemas.openxmlformats.org/drawingml/2006/main" xmlns:r="http://schemas.openxmlformats.org/officeDocument/2006/relationships" xmlns:p="http://schemas.openxmlformats.org/presentationml/2006/main">
   <p:cSld>
     <p:spTree>
       <p:nvGrpSpPr>
@@ -16737,11 +16736,11 @@
   <p:clrMapOvr>
     <a:masterClrMapping/>
   </p:clrMapOvr>
-  <mc:AlternateContent xmlns:mc="http://schemas.openxmlformats.org/markup-compatibility/2006" xmlns:p14="http://schemas.microsoft.com/office/powerpoint/2010/main">
-    <mc:Choice Requires="p14">
+  <mc:AlternateContent xmlns:mc="http://schemas.openxmlformats.org/markup-compatibility/2006">
+    <mc:Choice xmlns:p14="http://schemas.microsoft.com/office/powerpoint/2010/main" Requires="p14">
       <p:transition spd="slow" p14:dur="2000"/>
     </mc:Choice>
-    <mc:Fallback xmlns="">
+    <mc:Fallback>
       <p:transition spd="slow"/>
     </mc:Fallback>
   </mc:AlternateContent>
@@ -16756,7 +16755,7 @@
 </file>
 
 <file path=ppt/slides/slide20.xml><?xml version="1.0" encoding="utf-8"?>
-<p:sld xmlns:a="http://schemas.openxmlformats.org/drawingml/2006/main" xmlns:r="http://schemas.openxmlformats.org/officeDocument/2006/relationships" xmlns:p="http://schemas.openxmlformats.org/presentationml/2006/main" show="0">
+<p:sld xmlns:a="http://schemas.openxmlformats.org/drawingml/2006/main" xmlns:r="http://schemas.openxmlformats.org/officeDocument/2006/relationships" xmlns:p="http://schemas.openxmlformats.org/presentationml/2006/main">
   <p:cSld>
     <p:spTree>
       <p:nvGrpSpPr>
@@ -16828,11 +16827,11 @@
   <p:clrMapOvr>
     <a:masterClrMapping/>
   </p:clrMapOvr>
-  <mc:AlternateContent xmlns:mc="http://schemas.openxmlformats.org/markup-compatibility/2006" xmlns:p14="http://schemas.microsoft.com/office/powerpoint/2010/main">
-    <mc:Choice Requires="p14">
+  <mc:AlternateContent xmlns:mc="http://schemas.openxmlformats.org/markup-compatibility/2006">
+    <mc:Choice xmlns:p14="http://schemas.microsoft.com/office/powerpoint/2010/main" Requires="p14">
       <p:transition spd="slow" p14:dur="2000"/>
     </mc:Choice>
-    <mc:Fallback xmlns="">
+    <mc:Fallback>
       <p:transition spd="slow"/>
     </mc:Fallback>
   </mc:AlternateContent>
@@ -16847,7 +16846,7 @@
 </file>
 
 <file path=ppt/slides/slide21.xml><?xml version="1.0" encoding="utf-8"?>
-<p:sld xmlns:a="http://schemas.openxmlformats.org/drawingml/2006/main" xmlns:r="http://schemas.openxmlformats.org/officeDocument/2006/relationships" xmlns:p="http://schemas.openxmlformats.org/presentationml/2006/main" show="0">
+<p:sld xmlns:a="http://schemas.openxmlformats.org/drawingml/2006/main" xmlns:r="http://schemas.openxmlformats.org/officeDocument/2006/relationships" xmlns:p="http://schemas.openxmlformats.org/presentationml/2006/main">
   <p:cSld>
     <p:spTree>
       <p:nvGrpSpPr>
@@ -17036,11 +17035,11 @@
   <p:clrMapOvr>
     <a:masterClrMapping/>
   </p:clrMapOvr>
-  <mc:AlternateContent xmlns:mc="http://schemas.openxmlformats.org/markup-compatibility/2006" xmlns:p14="http://schemas.microsoft.com/office/powerpoint/2010/main">
-    <mc:Choice Requires="p14">
+  <mc:AlternateContent xmlns:mc="http://schemas.openxmlformats.org/markup-compatibility/2006">
+    <mc:Choice xmlns:p14="http://schemas.microsoft.com/office/powerpoint/2010/main" Requires="p14">
       <p:transition spd="slow" p14:dur="2000"/>
     </mc:Choice>
-    <mc:Fallback xmlns="">
+    <mc:Fallback>
       <p:transition spd="slow"/>
     </mc:Fallback>
   </mc:AlternateContent>
@@ -17055,7 +17054,7 @@
 </file>
 
 <file path=ppt/slides/slide22.xml><?xml version="1.0" encoding="utf-8"?>
-<p:sld xmlns:a="http://schemas.openxmlformats.org/drawingml/2006/main" xmlns:r="http://schemas.openxmlformats.org/officeDocument/2006/relationships" xmlns:p="http://schemas.openxmlformats.org/presentationml/2006/main" show="0">
+<p:sld xmlns:a="http://schemas.openxmlformats.org/drawingml/2006/main" xmlns:r="http://schemas.openxmlformats.org/officeDocument/2006/relationships" xmlns:p="http://schemas.openxmlformats.org/presentationml/2006/main">
   <p:cSld>
     <p:spTree>
       <p:nvGrpSpPr>
@@ -17386,11 +17385,11 @@
   <p:clrMapOvr>
     <a:masterClrMapping/>
   </p:clrMapOvr>
-  <mc:AlternateContent xmlns:mc="http://schemas.openxmlformats.org/markup-compatibility/2006" xmlns:p14="http://schemas.microsoft.com/office/powerpoint/2010/main">
-    <mc:Choice Requires="p14">
+  <mc:AlternateContent xmlns:mc="http://schemas.openxmlformats.org/markup-compatibility/2006">
+    <mc:Choice xmlns:p14="http://schemas.microsoft.com/office/powerpoint/2010/main" Requires="p14">
       <p:transition spd="slow" p14:dur="2000"/>
     </mc:Choice>
-    <mc:Fallback xmlns="">
+    <mc:Fallback>
       <p:transition spd="slow"/>
     </mc:Fallback>
   </mc:AlternateContent>
@@ -17405,7 +17404,7 @@
 </file>
 
 <file path=ppt/slides/slide23.xml><?xml version="1.0" encoding="utf-8"?>
-<p:sld xmlns:a="http://schemas.openxmlformats.org/drawingml/2006/main" xmlns:r="http://schemas.openxmlformats.org/officeDocument/2006/relationships" xmlns:p="http://schemas.openxmlformats.org/presentationml/2006/main" show="0">
+<p:sld xmlns:a="http://schemas.openxmlformats.org/drawingml/2006/main" xmlns:r="http://schemas.openxmlformats.org/officeDocument/2006/relationships" xmlns:p="http://schemas.openxmlformats.org/presentationml/2006/main">
   <p:cSld>
     <p:spTree>
       <p:nvGrpSpPr>
@@ -17722,11 +17721,11 @@
   <p:clrMapOvr>
     <a:masterClrMapping/>
   </p:clrMapOvr>
-  <mc:AlternateContent xmlns:mc="http://schemas.openxmlformats.org/markup-compatibility/2006" xmlns:p14="http://schemas.microsoft.com/office/powerpoint/2010/main">
-    <mc:Choice Requires="p14">
+  <mc:AlternateContent xmlns:mc="http://schemas.openxmlformats.org/markup-compatibility/2006">
+    <mc:Choice xmlns:p14="http://schemas.microsoft.com/office/powerpoint/2010/main" Requires="p14">
       <p:transition spd="slow" p14:dur="2000"/>
     </mc:Choice>
-    <mc:Fallback xmlns="">
+    <mc:Fallback>
       <p:transition spd="slow"/>
     </mc:Fallback>
   </mc:AlternateContent>
@@ -17741,7 +17740,7 @@
 </file>
 
 <file path=ppt/slides/slide24.xml><?xml version="1.0" encoding="utf-8"?>
-<p:sld xmlns:a="http://schemas.openxmlformats.org/drawingml/2006/main" xmlns:r="http://schemas.openxmlformats.org/officeDocument/2006/relationships" xmlns:p="http://schemas.openxmlformats.org/presentationml/2006/main" show="0">
+<p:sld xmlns:a="http://schemas.openxmlformats.org/drawingml/2006/main" xmlns:r="http://schemas.openxmlformats.org/officeDocument/2006/relationships" xmlns:p="http://schemas.openxmlformats.org/presentationml/2006/main">
   <p:cSld>
     <p:spTree>
       <p:nvGrpSpPr>
@@ -17864,11 +17863,11 @@
   <p:clrMapOvr>
     <a:masterClrMapping/>
   </p:clrMapOvr>
-  <mc:AlternateContent xmlns:mc="http://schemas.openxmlformats.org/markup-compatibility/2006" xmlns:p14="http://schemas.microsoft.com/office/powerpoint/2010/main">
-    <mc:Choice Requires="p14">
+  <mc:AlternateContent xmlns:mc="http://schemas.openxmlformats.org/markup-compatibility/2006">
+    <mc:Choice xmlns:p14="http://schemas.microsoft.com/office/powerpoint/2010/main" Requires="p14">
       <p:transition spd="slow" p14:dur="2000"/>
     </mc:Choice>
-    <mc:Fallback xmlns="">
+    <mc:Fallback>
       <p:transition spd="slow"/>
     </mc:Fallback>
   </mc:AlternateContent>
@@ -17883,7 +17882,7 @@
 </file>
 
 <file path=ppt/slides/slide25.xml><?xml version="1.0" encoding="utf-8"?>
-<p:sld xmlns:a="http://schemas.openxmlformats.org/drawingml/2006/main" xmlns:r="http://schemas.openxmlformats.org/officeDocument/2006/relationships" xmlns:p="http://schemas.openxmlformats.org/presentationml/2006/main" show="0">
+<p:sld xmlns:a="http://schemas.openxmlformats.org/drawingml/2006/main" xmlns:r="http://schemas.openxmlformats.org/officeDocument/2006/relationships" xmlns:p="http://schemas.openxmlformats.org/presentationml/2006/main">
   <p:cSld>
     <p:spTree>
       <p:nvGrpSpPr>
@@ -18591,11 +18590,11 @@
   <p:clrMapOvr>
     <a:masterClrMapping/>
   </p:clrMapOvr>
-  <mc:AlternateContent xmlns:mc="http://schemas.openxmlformats.org/markup-compatibility/2006" xmlns:p14="http://schemas.microsoft.com/office/powerpoint/2010/main">
-    <mc:Choice Requires="p14">
+  <mc:AlternateContent xmlns:mc="http://schemas.openxmlformats.org/markup-compatibility/2006">
+    <mc:Choice xmlns:p14="http://schemas.microsoft.com/office/powerpoint/2010/main" Requires="p14">
       <p:transition spd="slow" p14:dur="2000"/>
     </mc:Choice>
-    <mc:Fallback xmlns="">
+    <mc:Fallback>
       <p:transition spd="slow"/>
     </mc:Fallback>
   </mc:AlternateContent>
@@ -18610,7 +18609,7 @@
 </file>
 
 <file path=ppt/slides/slide26.xml><?xml version="1.0" encoding="utf-8"?>
-<p:sld xmlns:a="http://schemas.openxmlformats.org/drawingml/2006/main" xmlns:r="http://schemas.openxmlformats.org/officeDocument/2006/relationships" xmlns:p="http://schemas.openxmlformats.org/presentationml/2006/main" show="0">
+<p:sld xmlns:a="http://schemas.openxmlformats.org/drawingml/2006/main" xmlns:r="http://schemas.openxmlformats.org/officeDocument/2006/relationships" xmlns:p="http://schemas.openxmlformats.org/presentationml/2006/main">
   <p:cSld>
     <p:spTree>
       <p:nvGrpSpPr>
@@ -18939,11 +18938,11 @@
   <p:clrMapOvr>
     <a:masterClrMapping/>
   </p:clrMapOvr>
-  <mc:AlternateContent xmlns:mc="http://schemas.openxmlformats.org/markup-compatibility/2006" xmlns:p14="http://schemas.microsoft.com/office/powerpoint/2010/main">
-    <mc:Choice Requires="p14">
+  <mc:AlternateContent xmlns:mc="http://schemas.openxmlformats.org/markup-compatibility/2006">
+    <mc:Choice xmlns:p14="http://schemas.microsoft.com/office/powerpoint/2010/main" Requires="p14">
       <p:transition spd="slow" p14:dur="2000"/>
     </mc:Choice>
-    <mc:Fallback xmlns="">
+    <mc:Fallback>
       <p:transition spd="slow"/>
     </mc:Fallback>
   </mc:AlternateContent>
@@ -18958,7 +18957,7 @@
 </file>
 
 <file path=ppt/slides/slide27.xml><?xml version="1.0" encoding="utf-8"?>
-<p:sld xmlns:a="http://schemas.openxmlformats.org/drawingml/2006/main" xmlns:r="http://schemas.openxmlformats.org/officeDocument/2006/relationships" xmlns:p="http://schemas.openxmlformats.org/presentationml/2006/main" show="0">
+<p:sld xmlns:a="http://schemas.openxmlformats.org/drawingml/2006/main" xmlns:r="http://schemas.openxmlformats.org/officeDocument/2006/relationships" xmlns:p="http://schemas.openxmlformats.org/presentationml/2006/main">
   <p:cSld>
     <p:spTree>
       <p:nvGrpSpPr>
@@ -19034,11 +19033,11 @@
   <p:clrMapOvr>
     <a:masterClrMapping/>
   </p:clrMapOvr>
-  <mc:AlternateContent xmlns:mc="http://schemas.openxmlformats.org/markup-compatibility/2006" xmlns:p14="http://schemas.microsoft.com/office/powerpoint/2010/main">
-    <mc:Choice Requires="p14">
+  <mc:AlternateContent xmlns:mc="http://schemas.openxmlformats.org/markup-compatibility/2006">
+    <mc:Choice xmlns:p14="http://schemas.microsoft.com/office/powerpoint/2010/main" Requires="p14">
       <p:transition spd="slow" p14:dur="2000"/>
     </mc:Choice>
-    <mc:Fallback xmlns="">
+    <mc:Fallback>
       <p:transition spd="slow"/>
     </mc:Fallback>
   </mc:AlternateContent>
@@ -19053,7 +19052,7 @@
 </file>
 
 <file path=ppt/slides/slide28.xml><?xml version="1.0" encoding="utf-8"?>
-<p:sld xmlns:a="http://schemas.openxmlformats.org/drawingml/2006/main" xmlns:r="http://schemas.openxmlformats.org/officeDocument/2006/relationships" xmlns:p="http://schemas.openxmlformats.org/presentationml/2006/main" show="0">
+<p:sld xmlns:a="http://schemas.openxmlformats.org/drawingml/2006/main" xmlns:r="http://schemas.openxmlformats.org/officeDocument/2006/relationships" xmlns:p="http://schemas.openxmlformats.org/presentationml/2006/main">
   <p:cSld>
     <p:spTree>
       <p:nvGrpSpPr>
@@ -19292,11 +19291,11 @@
   <p:clrMapOvr>
     <a:masterClrMapping/>
   </p:clrMapOvr>
-  <mc:AlternateContent xmlns:mc="http://schemas.openxmlformats.org/markup-compatibility/2006" xmlns:p14="http://schemas.microsoft.com/office/powerpoint/2010/main">
-    <mc:Choice Requires="p14">
+  <mc:AlternateContent xmlns:mc="http://schemas.openxmlformats.org/markup-compatibility/2006">
+    <mc:Choice xmlns:p14="http://schemas.microsoft.com/office/powerpoint/2010/main" Requires="p14">
       <p:transition spd="slow" p14:dur="2000"/>
     </mc:Choice>
-    <mc:Fallback xmlns="">
+    <mc:Fallback>
       <p:transition spd="slow"/>
     </mc:Fallback>
   </mc:AlternateContent>
@@ -19311,7 +19310,7 @@
 </file>
 
 <file path=ppt/slides/slide29.xml><?xml version="1.0" encoding="utf-8"?>
-<p:sld xmlns:a="http://schemas.openxmlformats.org/drawingml/2006/main" xmlns:r="http://schemas.openxmlformats.org/officeDocument/2006/relationships" xmlns:p="http://schemas.openxmlformats.org/presentationml/2006/main" show="0">
+<p:sld xmlns:a="http://schemas.openxmlformats.org/drawingml/2006/main" xmlns:r="http://schemas.openxmlformats.org/officeDocument/2006/relationships" xmlns:p="http://schemas.openxmlformats.org/presentationml/2006/main">
   <p:cSld>
     <p:spTree>
       <p:nvGrpSpPr>
@@ -20102,11 +20101,11 @@
   <p:clrMapOvr>
     <a:masterClrMapping/>
   </p:clrMapOvr>
-  <mc:AlternateContent xmlns:mc="http://schemas.openxmlformats.org/markup-compatibility/2006" xmlns:p14="http://schemas.microsoft.com/office/powerpoint/2010/main">
-    <mc:Choice Requires="p14">
+  <mc:AlternateContent xmlns:mc="http://schemas.openxmlformats.org/markup-compatibility/2006">
+    <mc:Choice xmlns:p14="http://schemas.microsoft.com/office/powerpoint/2010/main" Requires="p14">
       <p:transition spd="slow" p14:dur="2000"/>
     </mc:Choice>
-    <mc:Fallback xmlns="">
+    <mc:Fallback>
       <p:transition spd="slow"/>
     </mc:Fallback>
   </mc:AlternateContent>
@@ -20121,7 +20120,7 @@
 </file>
 
 <file path=ppt/slides/slide3.xml><?xml version="1.0" encoding="utf-8"?>
-<p:sld xmlns:a="http://schemas.openxmlformats.org/drawingml/2006/main" xmlns:r="http://schemas.openxmlformats.org/officeDocument/2006/relationships" xmlns:p="http://schemas.openxmlformats.org/presentationml/2006/main" show="0">
+<p:sld xmlns:a="http://schemas.openxmlformats.org/drawingml/2006/main" xmlns:r="http://schemas.openxmlformats.org/officeDocument/2006/relationships" xmlns:p="http://schemas.openxmlformats.org/presentationml/2006/main">
   <p:cSld>
     <p:spTree>
       <p:nvGrpSpPr>
@@ -20196,7 +20195,7 @@
             <a:graphicData uri="http://schemas.openxmlformats.org/presentationml/2006/ole">
               <mc:AlternateContent xmlns:mc="http://schemas.openxmlformats.org/markup-compatibility/2006">
                 <mc:Choice xmlns:v="urn:schemas-microsoft-com:vml" Requires="v">
-                  <p:oleObj spid="_x0000_s2770" name="Image" r:id="rId3" imgW="11669760" imgH="4025160" progId="Photoshop.Image.55">
+                  <p:oleObj spid="_x0000_s2773" name="Image" r:id="rId3" imgW="11669760" imgH="4025160" progId="Photoshop.Image.55">
                     <p:embed/>
                   </p:oleObj>
                 </mc:Choice>
@@ -20253,7 +20252,7 @@
             <a:graphicData uri="http://schemas.openxmlformats.org/presentationml/2006/ole">
               <mc:AlternateContent xmlns:mc="http://schemas.openxmlformats.org/markup-compatibility/2006">
                 <mc:Choice xmlns:v="urn:schemas-microsoft-com:vml" Requires="v">
-                  <p:oleObj spid="_x0000_s2771" name="Image" r:id="rId5" imgW="11669760" imgH="4025160" progId="Photoshop.Image.55">
+                  <p:oleObj spid="_x0000_s2774" name="Image" r:id="rId5" imgW="11669760" imgH="4025160" progId="Photoshop.Image.55">
                     <p:embed/>
                   </p:oleObj>
                 </mc:Choice>
@@ -20310,7 +20309,7 @@
             <a:graphicData uri="http://schemas.openxmlformats.org/presentationml/2006/ole">
               <mc:AlternateContent xmlns:mc="http://schemas.openxmlformats.org/markup-compatibility/2006">
                 <mc:Choice xmlns:v="urn:schemas-microsoft-com:vml" Requires="v">
-                  <p:oleObj spid="_x0000_s2772" name="Image" r:id="rId7" imgW="11669760" imgH="4025160" progId="Photoshop.Image.55">
+                  <p:oleObj spid="_x0000_s2775" name="Image" r:id="rId7" imgW="11669760" imgH="4025160" progId="Photoshop.Image.55">
                     <p:embed/>
                   </p:oleObj>
                 </mc:Choice>
@@ -20677,11 +20676,11 @@
   <p:clrMapOvr>
     <a:masterClrMapping/>
   </p:clrMapOvr>
-  <mc:AlternateContent xmlns:mc="http://schemas.openxmlformats.org/markup-compatibility/2006" xmlns:p14="http://schemas.microsoft.com/office/powerpoint/2010/main">
-    <mc:Choice Requires="p14">
+  <mc:AlternateContent xmlns:mc="http://schemas.openxmlformats.org/markup-compatibility/2006">
+    <mc:Choice xmlns:p14="http://schemas.microsoft.com/office/powerpoint/2010/main" Requires="p14">
       <p:transition spd="slow" p14:dur="2000"/>
     </mc:Choice>
-    <mc:Fallback xmlns="">
+    <mc:Fallback>
       <p:transition spd="slow"/>
     </mc:Fallback>
   </mc:AlternateContent>
@@ -20696,7 +20695,7 @@
 </file>
 
 <file path=ppt/slides/slide30.xml><?xml version="1.0" encoding="utf-8"?>
-<p:sld xmlns:a="http://schemas.openxmlformats.org/drawingml/2006/main" xmlns:r="http://schemas.openxmlformats.org/officeDocument/2006/relationships" xmlns:p="http://schemas.openxmlformats.org/presentationml/2006/main" show="0">
+<p:sld xmlns:a="http://schemas.openxmlformats.org/drawingml/2006/main" xmlns:r="http://schemas.openxmlformats.org/officeDocument/2006/relationships" xmlns:p="http://schemas.openxmlformats.org/presentationml/2006/main">
   <p:cSld>
     <p:spTree>
       <p:nvGrpSpPr>
@@ -21288,11 +21287,11 @@
   <p:clrMapOvr>
     <a:masterClrMapping/>
   </p:clrMapOvr>
-  <mc:AlternateContent xmlns:mc="http://schemas.openxmlformats.org/markup-compatibility/2006" xmlns:p14="http://schemas.microsoft.com/office/powerpoint/2010/main">
-    <mc:Choice Requires="p14">
+  <mc:AlternateContent xmlns:mc="http://schemas.openxmlformats.org/markup-compatibility/2006">
+    <mc:Choice xmlns:p14="http://schemas.microsoft.com/office/powerpoint/2010/main" Requires="p14">
       <p:transition spd="slow" p14:dur="2000"/>
     </mc:Choice>
-    <mc:Fallback xmlns="">
+    <mc:Fallback>
       <p:transition spd="slow"/>
     </mc:Fallback>
   </mc:AlternateContent>
@@ -21307,7 +21306,7 @@
 </file>
 
 <file path=ppt/slides/slide31.xml><?xml version="1.0" encoding="utf-8"?>
-<p:sld xmlns:a="http://schemas.openxmlformats.org/drawingml/2006/main" xmlns:r="http://schemas.openxmlformats.org/officeDocument/2006/relationships" xmlns:p="http://schemas.openxmlformats.org/presentationml/2006/main" show="0">
+<p:sld xmlns:a="http://schemas.openxmlformats.org/drawingml/2006/main" xmlns:r="http://schemas.openxmlformats.org/officeDocument/2006/relationships" xmlns:p="http://schemas.openxmlformats.org/presentationml/2006/main">
   <p:cSld>
     <p:spTree>
       <p:nvGrpSpPr>
@@ -22366,11 +22365,11 @@
   <p:clrMapOvr>
     <a:masterClrMapping/>
   </p:clrMapOvr>
-  <mc:AlternateContent xmlns:mc="http://schemas.openxmlformats.org/markup-compatibility/2006" xmlns:p14="http://schemas.microsoft.com/office/powerpoint/2010/main">
-    <mc:Choice Requires="p14">
+  <mc:AlternateContent xmlns:mc="http://schemas.openxmlformats.org/markup-compatibility/2006">
+    <mc:Choice xmlns:p14="http://schemas.microsoft.com/office/powerpoint/2010/main" Requires="p14">
       <p:transition spd="slow" p14:dur="2000"/>
     </mc:Choice>
-    <mc:Fallback xmlns="">
+    <mc:Fallback>
       <p:transition spd="slow"/>
     </mc:Fallback>
   </mc:AlternateContent>
@@ -22385,7 +22384,7 @@
 </file>
 
 <file path=ppt/slides/slide32.xml><?xml version="1.0" encoding="utf-8"?>
-<p:sld xmlns:a="http://schemas.openxmlformats.org/drawingml/2006/main" xmlns:r="http://schemas.openxmlformats.org/officeDocument/2006/relationships" xmlns:p="http://schemas.openxmlformats.org/presentationml/2006/main" show="0">
+<p:sld xmlns:a="http://schemas.openxmlformats.org/drawingml/2006/main" xmlns:r="http://schemas.openxmlformats.org/officeDocument/2006/relationships" xmlns:p="http://schemas.openxmlformats.org/presentationml/2006/main">
   <p:cSld>
     <p:spTree>
       <p:nvGrpSpPr>
@@ -22532,11 +22531,11 @@
   <p:clrMapOvr>
     <a:masterClrMapping/>
   </p:clrMapOvr>
-  <mc:AlternateContent xmlns:mc="http://schemas.openxmlformats.org/markup-compatibility/2006" xmlns:p14="http://schemas.microsoft.com/office/powerpoint/2010/main">
-    <mc:Choice Requires="p14">
+  <mc:AlternateContent xmlns:mc="http://schemas.openxmlformats.org/markup-compatibility/2006">
+    <mc:Choice xmlns:p14="http://schemas.microsoft.com/office/powerpoint/2010/main" Requires="p14">
       <p:transition spd="slow" p14:dur="2000"/>
     </mc:Choice>
-    <mc:Fallback xmlns="">
+    <mc:Fallback>
       <p:transition spd="slow"/>
     </mc:Fallback>
   </mc:AlternateContent>
@@ -22551,7 +22550,7 @@
 </file>
 
 <file path=ppt/slides/slide33.xml><?xml version="1.0" encoding="utf-8"?>
-<p:sld xmlns:a="http://schemas.openxmlformats.org/drawingml/2006/main" xmlns:r="http://schemas.openxmlformats.org/officeDocument/2006/relationships" xmlns:p="http://schemas.openxmlformats.org/presentationml/2006/main" show="0">
+<p:sld xmlns:a="http://schemas.openxmlformats.org/drawingml/2006/main" xmlns:r="http://schemas.openxmlformats.org/officeDocument/2006/relationships" xmlns:p="http://schemas.openxmlformats.org/presentationml/2006/main">
   <p:cSld>
     <p:spTree>
       <p:nvGrpSpPr>
@@ -22665,11 +22664,11 @@
   <p:clrMapOvr>
     <a:masterClrMapping/>
   </p:clrMapOvr>
-  <mc:AlternateContent xmlns:mc="http://schemas.openxmlformats.org/markup-compatibility/2006" xmlns:p14="http://schemas.microsoft.com/office/powerpoint/2010/main">
-    <mc:Choice Requires="p14">
+  <mc:AlternateContent xmlns:mc="http://schemas.openxmlformats.org/markup-compatibility/2006">
+    <mc:Choice xmlns:p14="http://schemas.microsoft.com/office/powerpoint/2010/main" Requires="p14">
       <p:transition spd="slow" p14:dur="2000"/>
     </mc:Choice>
-    <mc:Fallback xmlns="">
+    <mc:Fallback>
       <p:transition spd="slow"/>
     </mc:Fallback>
   </mc:AlternateContent>
@@ -22684,7 +22683,7 @@
 </file>
 
 <file path=ppt/slides/slide34.xml><?xml version="1.0" encoding="utf-8"?>
-<p:sld xmlns:a="http://schemas.openxmlformats.org/drawingml/2006/main" xmlns:r="http://schemas.openxmlformats.org/officeDocument/2006/relationships" xmlns:p="http://schemas.openxmlformats.org/presentationml/2006/main" show="0">
+<p:sld xmlns:a="http://schemas.openxmlformats.org/drawingml/2006/main" xmlns:r="http://schemas.openxmlformats.org/officeDocument/2006/relationships" xmlns:p="http://schemas.openxmlformats.org/presentationml/2006/main">
   <p:cSld>
     <p:spTree>
       <p:nvGrpSpPr>
@@ -22781,11 +22780,11 @@
   <p:clrMapOvr>
     <a:masterClrMapping/>
   </p:clrMapOvr>
-  <mc:AlternateContent xmlns:mc="http://schemas.openxmlformats.org/markup-compatibility/2006" xmlns:p14="http://schemas.microsoft.com/office/powerpoint/2010/main">
-    <mc:Choice Requires="p14">
+  <mc:AlternateContent xmlns:mc="http://schemas.openxmlformats.org/markup-compatibility/2006">
+    <mc:Choice xmlns:p14="http://schemas.microsoft.com/office/powerpoint/2010/main" Requires="p14">
       <p:transition spd="slow" p14:dur="2000"/>
     </mc:Choice>
-    <mc:Fallback xmlns="">
+    <mc:Fallback>
       <p:transition spd="slow"/>
     </mc:Fallback>
   </mc:AlternateContent>
@@ -22800,7 +22799,7 @@
 </file>
 
 <file path=ppt/slides/slide35.xml><?xml version="1.0" encoding="utf-8"?>
-<p:sld xmlns:a="http://schemas.openxmlformats.org/drawingml/2006/main" xmlns:r="http://schemas.openxmlformats.org/officeDocument/2006/relationships" xmlns:p="http://schemas.openxmlformats.org/presentationml/2006/main" show="0">
+<p:sld xmlns:a="http://schemas.openxmlformats.org/drawingml/2006/main" xmlns:r="http://schemas.openxmlformats.org/officeDocument/2006/relationships" xmlns:p="http://schemas.openxmlformats.org/presentationml/2006/main">
   <p:cSld>
     <p:spTree>
       <p:nvGrpSpPr>
@@ -23025,11 +23024,11 @@
   <p:clrMapOvr>
     <a:masterClrMapping/>
   </p:clrMapOvr>
-  <mc:AlternateContent xmlns:mc="http://schemas.openxmlformats.org/markup-compatibility/2006" xmlns:p14="http://schemas.microsoft.com/office/powerpoint/2010/main">
-    <mc:Choice Requires="p14">
+  <mc:AlternateContent xmlns:mc="http://schemas.openxmlformats.org/markup-compatibility/2006">
+    <mc:Choice xmlns:p14="http://schemas.microsoft.com/office/powerpoint/2010/main" Requires="p14">
       <p:transition spd="slow" p14:dur="2000"/>
     </mc:Choice>
-    <mc:Fallback xmlns="">
+    <mc:Fallback>
       <p:transition spd="slow"/>
     </mc:Fallback>
   </mc:AlternateContent>
@@ -23044,7 +23043,7 @@
 </file>
 
 <file path=ppt/slides/slide36.xml><?xml version="1.0" encoding="utf-8"?>
-<p:sld xmlns:a="http://schemas.openxmlformats.org/drawingml/2006/main" xmlns:r="http://schemas.openxmlformats.org/officeDocument/2006/relationships" xmlns:p="http://schemas.openxmlformats.org/presentationml/2006/main" show="0">
+<p:sld xmlns:a="http://schemas.openxmlformats.org/drawingml/2006/main" xmlns:r="http://schemas.openxmlformats.org/officeDocument/2006/relationships" xmlns:p="http://schemas.openxmlformats.org/presentationml/2006/main">
   <p:cSld>
     <p:spTree>
       <p:nvGrpSpPr>
@@ -23116,11 +23115,11 @@
   <p:clrMapOvr>
     <a:masterClrMapping/>
   </p:clrMapOvr>
-  <mc:AlternateContent xmlns:mc="http://schemas.openxmlformats.org/markup-compatibility/2006" xmlns:p14="http://schemas.microsoft.com/office/powerpoint/2010/main">
-    <mc:Choice Requires="p14">
+  <mc:AlternateContent xmlns:mc="http://schemas.openxmlformats.org/markup-compatibility/2006">
+    <mc:Choice xmlns:p14="http://schemas.microsoft.com/office/powerpoint/2010/main" Requires="p14">
       <p:transition spd="slow" p14:dur="2000"/>
     </mc:Choice>
-    <mc:Fallback xmlns="">
+    <mc:Fallback>
       <p:transition spd="slow"/>
     </mc:Fallback>
   </mc:AlternateContent>
@@ -23135,7 +23134,7 @@
 </file>
 
 <file path=ppt/slides/slide37.xml><?xml version="1.0" encoding="utf-8"?>
-<p:sld xmlns:a="http://schemas.openxmlformats.org/drawingml/2006/main" xmlns:r="http://schemas.openxmlformats.org/officeDocument/2006/relationships" xmlns:p="http://schemas.openxmlformats.org/presentationml/2006/main" show="0">
+<p:sld xmlns:a="http://schemas.openxmlformats.org/drawingml/2006/main" xmlns:r="http://schemas.openxmlformats.org/officeDocument/2006/relationships" xmlns:p="http://schemas.openxmlformats.org/presentationml/2006/main">
   <p:cSld>
     <p:spTree>
       <p:nvGrpSpPr>
@@ -23496,11 +23495,11 @@
   <p:clrMapOvr>
     <a:masterClrMapping/>
   </p:clrMapOvr>
-  <mc:AlternateContent xmlns:mc="http://schemas.openxmlformats.org/markup-compatibility/2006" xmlns:p14="http://schemas.microsoft.com/office/powerpoint/2010/main">
-    <mc:Choice Requires="p14">
+  <mc:AlternateContent xmlns:mc="http://schemas.openxmlformats.org/markup-compatibility/2006">
+    <mc:Choice xmlns:p14="http://schemas.microsoft.com/office/powerpoint/2010/main" Requires="p14">
       <p:transition spd="slow" p14:dur="2000"/>
     </mc:Choice>
-    <mc:Fallback xmlns="">
+    <mc:Fallback>
       <p:transition spd="slow"/>
     </mc:Fallback>
   </mc:AlternateContent>
@@ -23515,7 +23514,7 @@
 </file>
 
 <file path=ppt/slides/slide38.xml><?xml version="1.0" encoding="utf-8"?>
-<p:sld xmlns:a="http://schemas.openxmlformats.org/drawingml/2006/main" xmlns:r="http://schemas.openxmlformats.org/officeDocument/2006/relationships" xmlns:p="http://schemas.openxmlformats.org/presentationml/2006/main" show="0">
+<p:sld xmlns:a="http://schemas.openxmlformats.org/drawingml/2006/main" xmlns:r="http://schemas.openxmlformats.org/officeDocument/2006/relationships" xmlns:p="http://schemas.openxmlformats.org/presentationml/2006/main">
   <p:cSld>
     <p:spTree>
       <p:nvGrpSpPr>
@@ -24626,11 +24625,11 @@
   <p:clrMapOvr>
     <a:masterClrMapping/>
   </p:clrMapOvr>
-  <mc:AlternateContent xmlns:mc="http://schemas.openxmlformats.org/markup-compatibility/2006" xmlns:p14="http://schemas.microsoft.com/office/powerpoint/2010/main">
-    <mc:Choice Requires="p14">
+  <mc:AlternateContent xmlns:mc="http://schemas.openxmlformats.org/markup-compatibility/2006">
+    <mc:Choice xmlns:p14="http://schemas.microsoft.com/office/powerpoint/2010/main" Requires="p14">
       <p:transition spd="slow" p14:dur="2000"/>
     </mc:Choice>
-    <mc:Fallback xmlns="">
+    <mc:Fallback>
       <p:transition spd="slow"/>
     </mc:Fallback>
   </mc:AlternateContent>
@@ -24645,7 +24644,7 @@
 </file>
 
 <file path=ppt/slides/slide39.xml><?xml version="1.0" encoding="utf-8"?>
-<p:sld xmlns:a="http://schemas.openxmlformats.org/drawingml/2006/main" xmlns:r="http://schemas.openxmlformats.org/officeDocument/2006/relationships" xmlns:p="http://schemas.openxmlformats.org/presentationml/2006/main" show="0">
+<p:sld xmlns:a="http://schemas.openxmlformats.org/drawingml/2006/main" xmlns:r="http://schemas.openxmlformats.org/officeDocument/2006/relationships" xmlns:p="http://schemas.openxmlformats.org/presentationml/2006/main">
   <p:cSld>
     <p:spTree>
       <p:nvGrpSpPr>
@@ -25205,11 +25204,11 @@
   <p:clrMapOvr>
     <a:masterClrMapping/>
   </p:clrMapOvr>
-  <mc:AlternateContent xmlns:mc="http://schemas.openxmlformats.org/markup-compatibility/2006" xmlns:p14="http://schemas.microsoft.com/office/powerpoint/2010/main">
-    <mc:Choice Requires="p14">
+  <mc:AlternateContent xmlns:mc="http://schemas.openxmlformats.org/markup-compatibility/2006">
+    <mc:Choice xmlns:p14="http://schemas.microsoft.com/office/powerpoint/2010/main" Requires="p14">
       <p:transition spd="slow" p14:dur="2000"/>
     </mc:Choice>
-    <mc:Fallback xmlns="">
+    <mc:Fallback>
       <p:transition spd="slow"/>
     </mc:Fallback>
   </mc:AlternateContent>
@@ -25224,7 +25223,7 @@
 </file>
 
 <file path=ppt/slides/slide4.xml><?xml version="1.0" encoding="utf-8"?>
-<p:sld xmlns:a="http://schemas.openxmlformats.org/drawingml/2006/main" xmlns:r="http://schemas.openxmlformats.org/officeDocument/2006/relationships" xmlns:p="http://schemas.openxmlformats.org/presentationml/2006/main" show="0">
+<p:sld xmlns:a="http://schemas.openxmlformats.org/drawingml/2006/main" xmlns:r="http://schemas.openxmlformats.org/officeDocument/2006/relationships" xmlns:p="http://schemas.openxmlformats.org/presentationml/2006/main">
   <p:cSld>
     <p:spTree>
       <p:nvGrpSpPr>
@@ -25397,11 +25396,11 @@
   <p:clrMapOvr>
     <a:masterClrMapping/>
   </p:clrMapOvr>
-  <mc:AlternateContent xmlns:mc="http://schemas.openxmlformats.org/markup-compatibility/2006" xmlns:p14="http://schemas.microsoft.com/office/powerpoint/2010/main">
-    <mc:Choice Requires="p14">
+  <mc:AlternateContent xmlns:mc="http://schemas.openxmlformats.org/markup-compatibility/2006">
+    <mc:Choice xmlns:p14="http://schemas.microsoft.com/office/powerpoint/2010/main" Requires="p14">
       <p:transition spd="slow" p14:dur="2000"/>
     </mc:Choice>
-    <mc:Fallback xmlns="">
+    <mc:Fallback>
       <p:transition spd="slow"/>
     </mc:Fallback>
   </mc:AlternateContent>
@@ -25416,7 +25415,7 @@
 </file>
 
 <file path=ppt/slides/slide40.xml><?xml version="1.0" encoding="utf-8"?>
-<p:sld xmlns:a="http://schemas.openxmlformats.org/drawingml/2006/main" xmlns:r="http://schemas.openxmlformats.org/officeDocument/2006/relationships" xmlns:p="http://schemas.openxmlformats.org/presentationml/2006/main" show="0">
+<p:sld xmlns:a="http://schemas.openxmlformats.org/drawingml/2006/main" xmlns:r="http://schemas.openxmlformats.org/officeDocument/2006/relationships" xmlns:p="http://schemas.openxmlformats.org/presentationml/2006/main">
   <p:cSld>
     <p:spTree>
       <p:nvGrpSpPr>
@@ -26154,11 +26153,11 @@
   <p:clrMapOvr>
     <a:masterClrMapping/>
   </p:clrMapOvr>
-  <mc:AlternateContent xmlns:mc="http://schemas.openxmlformats.org/markup-compatibility/2006" xmlns:p14="http://schemas.microsoft.com/office/powerpoint/2010/main">
-    <mc:Choice Requires="p14">
+  <mc:AlternateContent xmlns:mc="http://schemas.openxmlformats.org/markup-compatibility/2006">
+    <mc:Choice xmlns:p14="http://schemas.microsoft.com/office/powerpoint/2010/main" Requires="p14">
       <p:transition spd="slow" p14:dur="2000"/>
     </mc:Choice>
-    <mc:Fallback xmlns="">
+    <mc:Fallback>
       <p:transition spd="slow"/>
     </mc:Fallback>
   </mc:AlternateContent>
@@ -26173,7 +26172,7 @@
 </file>
 
 <file path=ppt/slides/slide41.xml><?xml version="1.0" encoding="utf-8"?>
-<p:sld xmlns:a="http://schemas.openxmlformats.org/drawingml/2006/main" xmlns:r="http://schemas.openxmlformats.org/officeDocument/2006/relationships" xmlns:p="http://schemas.openxmlformats.org/presentationml/2006/main" show="0">
+<p:sld xmlns:a="http://schemas.openxmlformats.org/drawingml/2006/main" xmlns:r="http://schemas.openxmlformats.org/officeDocument/2006/relationships" xmlns:p="http://schemas.openxmlformats.org/presentationml/2006/main">
   <p:cSld>
     <p:spTree>
       <p:nvGrpSpPr>
@@ -27370,11 +27369,11 @@
   <p:clrMapOvr>
     <a:masterClrMapping/>
   </p:clrMapOvr>
-  <mc:AlternateContent xmlns:mc="http://schemas.openxmlformats.org/markup-compatibility/2006" xmlns:p14="http://schemas.microsoft.com/office/powerpoint/2010/main">
-    <mc:Choice Requires="p14">
+  <mc:AlternateContent xmlns:mc="http://schemas.openxmlformats.org/markup-compatibility/2006">
+    <mc:Choice xmlns:p14="http://schemas.microsoft.com/office/powerpoint/2010/main" Requires="p14">
       <p:transition spd="slow" p14:dur="2000"/>
     </mc:Choice>
-    <mc:Fallback xmlns="">
+    <mc:Fallback>
       <p:transition spd="slow"/>
     </mc:Fallback>
   </mc:AlternateContent>
@@ -27389,7 +27388,7 @@
 </file>
 
 <file path=ppt/slides/slide42.xml><?xml version="1.0" encoding="utf-8"?>
-<p:sld xmlns:a="http://schemas.openxmlformats.org/drawingml/2006/main" xmlns:r="http://schemas.openxmlformats.org/officeDocument/2006/relationships" xmlns:p="http://schemas.openxmlformats.org/presentationml/2006/main" show="0">
+<p:sld xmlns:a="http://schemas.openxmlformats.org/drawingml/2006/main" xmlns:r="http://schemas.openxmlformats.org/officeDocument/2006/relationships" xmlns:p="http://schemas.openxmlformats.org/presentationml/2006/main">
   <p:cSld>
     <p:spTree>
       <p:nvGrpSpPr>
@@ -28549,11 +28548,11 @@
   <p:clrMapOvr>
     <a:masterClrMapping/>
   </p:clrMapOvr>
-  <mc:AlternateContent xmlns:mc="http://schemas.openxmlformats.org/markup-compatibility/2006" xmlns:p14="http://schemas.microsoft.com/office/powerpoint/2010/main">
-    <mc:Choice Requires="p14">
+  <mc:AlternateContent xmlns:mc="http://schemas.openxmlformats.org/markup-compatibility/2006">
+    <mc:Choice xmlns:p14="http://schemas.microsoft.com/office/powerpoint/2010/main" Requires="p14">
       <p:transition spd="slow" p14:dur="2000"/>
     </mc:Choice>
-    <mc:Fallback xmlns="">
+    <mc:Fallback>
       <p:transition spd="slow"/>
     </mc:Fallback>
   </mc:AlternateContent>
@@ -28568,7 +28567,7 @@
 </file>
 
 <file path=ppt/slides/slide43.xml><?xml version="1.0" encoding="utf-8"?>
-<p:sld xmlns:a="http://schemas.openxmlformats.org/drawingml/2006/main" xmlns:r="http://schemas.openxmlformats.org/officeDocument/2006/relationships" xmlns:p="http://schemas.openxmlformats.org/presentationml/2006/main" show="0">
+<p:sld xmlns:a="http://schemas.openxmlformats.org/drawingml/2006/main" xmlns:r="http://schemas.openxmlformats.org/officeDocument/2006/relationships" xmlns:p="http://schemas.openxmlformats.org/presentationml/2006/main">
   <p:cSld>
     <p:spTree>
       <p:nvGrpSpPr>
@@ -28718,11 +28717,11 @@
   <p:clrMapOvr>
     <a:masterClrMapping/>
   </p:clrMapOvr>
-  <mc:AlternateContent xmlns:mc="http://schemas.openxmlformats.org/markup-compatibility/2006" xmlns:p14="http://schemas.microsoft.com/office/powerpoint/2010/main">
-    <mc:Choice Requires="p14">
+  <mc:AlternateContent xmlns:mc="http://schemas.openxmlformats.org/markup-compatibility/2006">
+    <mc:Choice xmlns:p14="http://schemas.microsoft.com/office/powerpoint/2010/main" Requires="p14">
       <p:transition spd="slow" p14:dur="2000"/>
     </mc:Choice>
-    <mc:Fallback xmlns="">
+    <mc:Fallback>
       <p:transition spd="slow"/>
     </mc:Fallback>
   </mc:AlternateContent>
@@ -28737,7 +28736,7 @@
 </file>
 
 <file path=ppt/slides/slide44.xml><?xml version="1.0" encoding="utf-8"?>
-<p:sld xmlns:a="http://schemas.openxmlformats.org/drawingml/2006/main" xmlns:r="http://schemas.openxmlformats.org/officeDocument/2006/relationships" xmlns:p="http://schemas.openxmlformats.org/presentationml/2006/main" show="0">
+<p:sld xmlns:a="http://schemas.openxmlformats.org/drawingml/2006/main" xmlns:r="http://schemas.openxmlformats.org/officeDocument/2006/relationships" xmlns:p="http://schemas.openxmlformats.org/presentationml/2006/main">
   <p:cSld>
     <p:spTree>
       <p:nvGrpSpPr>
@@ -29445,11 +29444,11 @@
   <p:clrMapOvr>
     <a:masterClrMapping/>
   </p:clrMapOvr>
-  <mc:AlternateContent xmlns:mc="http://schemas.openxmlformats.org/markup-compatibility/2006" xmlns:p14="http://schemas.microsoft.com/office/powerpoint/2010/main">
-    <mc:Choice Requires="p14">
+  <mc:AlternateContent xmlns:mc="http://schemas.openxmlformats.org/markup-compatibility/2006">
+    <mc:Choice xmlns:p14="http://schemas.microsoft.com/office/powerpoint/2010/main" Requires="p14">
       <p:transition spd="slow" p14:dur="2000"/>
     </mc:Choice>
-    <mc:Fallback xmlns="">
+    <mc:Fallback>
       <p:transition spd="slow"/>
     </mc:Fallback>
   </mc:AlternateContent>
@@ -29464,7 +29463,7 @@
 </file>
 
 <file path=ppt/slides/slide45.xml><?xml version="1.0" encoding="utf-8"?>
-<p:sld xmlns:a="http://schemas.openxmlformats.org/drawingml/2006/main" xmlns:r="http://schemas.openxmlformats.org/officeDocument/2006/relationships" xmlns:p="http://schemas.openxmlformats.org/presentationml/2006/main" show="0">
+<p:sld xmlns:a="http://schemas.openxmlformats.org/drawingml/2006/main" xmlns:r="http://schemas.openxmlformats.org/officeDocument/2006/relationships" xmlns:p="http://schemas.openxmlformats.org/presentationml/2006/main">
   <p:cSld>
     <p:spTree>
       <p:nvGrpSpPr>
@@ -29590,11 +29589,11 @@
   <p:clrMapOvr>
     <a:masterClrMapping/>
   </p:clrMapOvr>
-  <mc:AlternateContent xmlns:mc="http://schemas.openxmlformats.org/markup-compatibility/2006" xmlns:p14="http://schemas.microsoft.com/office/powerpoint/2010/main">
-    <mc:Choice Requires="p14">
+  <mc:AlternateContent xmlns:mc="http://schemas.openxmlformats.org/markup-compatibility/2006">
+    <mc:Choice xmlns:p14="http://schemas.microsoft.com/office/powerpoint/2010/main" Requires="p14">
       <p:transition spd="slow" p14:dur="2000"/>
     </mc:Choice>
-    <mc:Fallback xmlns="">
+    <mc:Fallback>
       <p:transition spd="slow"/>
     </mc:Fallback>
   </mc:AlternateContent>
@@ -29609,7 +29608,7 @@
 </file>
 
 <file path=ppt/slides/slide46.xml><?xml version="1.0" encoding="utf-8"?>
-<p:sld xmlns:a="http://schemas.openxmlformats.org/drawingml/2006/main" xmlns:r="http://schemas.openxmlformats.org/officeDocument/2006/relationships" xmlns:p="http://schemas.openxmlformats.org/presentationml/2006/main" show="0">
+<p:sld xmlns:a="http://schemas.openxmlformats.org/drawingml/2006/main" xmlns:r="http://schemas.openxmlformats.org/officeDocument/2006/relationships" xmlns:p="http://schemas.openxmlformats.org/presentationml/2006/main">
   <p:cSld>
     <p:spTree>
       <p:nvGrpSpPr>
@@ -30505,11 +30504,11 @@
   <p:clrMapOvr>
     <a:masterClrMapping/>
   </p:clrMapOvr>
-  <mc:AlternateContent xmlns:mc="http://schemas.openxmlformats.org/markup-compatibility/2006" xmlns:p14="http://schemas.microsoft.com/office/powerpoint/2010/main">
-    <mc:Choice Requires="p14">
+  <mc:AlternateContent xmlns:mc="http://schemas.openxmlformats.org/markup-compatibility/2006">
+    <mc:Choice xmlns:p14="http://schemas.microsoft.com/office/powerpoint/2010/main" Requires="p14">
       <p:transition spd="slow" p14:dur="2000"/>
     </mc:Choice>
-    <mc:Fallback xmlns="">
+    <mc:Fallback>
       <p:transition spd="slow"/>
     </mc:Fallback>
   </mc:AlternateContent>
@@ -30524,7 +30523,7 @@
 </file>
 
 <file path=ppt/slides/slide47.xml><?xml version="1.0" encoding="utf-8"?>
-<p:sld xmlns:a="http://schemas.openxmlformats.org/drawingml/2006/main" xmlns:r="http://schemas.openxmlformats.org/officeDocument/2006/relationships" xmlns:p="http://schemas.openxmlformats.org/presentationml/2006/main" show="0">
+<p:sld xmlns:a="http://schemas.openxmlformats.org/drawingml/2006/main" xmlns:r="http://schemas.openxmlformats.org/officeDocument/2006/relationships" xmlns:p="http://schemas.openxmlformats.org/presentationml/2006/main">
   <p:cSld>
     <p:spTree>
       <p:nvGrpSpPr>
@@ -30750,11 +30749,11 @@
   <p:clrMapOvr>
     <a:masterClrMapping/>
   </p:clrMapOvr>
-  <mc:AlternateContent xmlns:mc="http://schemas.openxmlformats.org/markup-compatibility/2006" xmlns:p14="http://schemas.microsoft.com/office/powerpoint/2010/main">
-    <mc:Choice Requires="p14">
+  <mc:AlternateContent xmlns:mc="http://schemas.openxmlformats.org/markup-compatibility/2006">
+    <mc:Choice xmlns:p14="http://schemas.microsoft.com/office/powerpoint/2010/main" Requires="p14">
       <p:transition spd="slow" p14:dur="2000"/>
     </mc:Choice>
-    <mc:Fallback xmlns="">
+    <mc:Fallback>
       <p:transition spd="slow"/>
     </mc:Fallback>
   </mc:AlternateContent>
@@ -30769,7 +30768,7 @@
 </file>
 
 <file path=ppt/slides/slide48.xml><?xml version="1.0" encoding="utf-8"?>
-<p:sld xmlns:a="http://schemas.openxmlformats.org/drawingml/2006/main" xmlns:r="http://schemas.openxmlformats.org/officeDocument/2006/relationships" xmlns:p="http://schemas.openxmlformats.org/presentationml/2006/main" show="0">
+<p:sld xmlns:a="http://schemas.openxmlformats.org/drawingml/2006/main" xmlns:r="http://schemas.openxmlformats.org/officeDocument/2006/relationships" xmlns:p="http://schemas.openxmlformats.org/presentationml/2006/main">
   <p:cSld>
     <p:spTree>
       <p:nvGrpSpPr>
@@ -31421,11 +31420,11 @@
   <p:clrMapOvr>
     <a:masterClrMapping/>
   </p:clrMapOvr>
-  <mc:AlternateContent xmlns:mc="http://schemas.openxmlformats.org/markup-compatibility/2006" xmlns:p14="http://schemas.microsoft.com/office/powerpoint/2010/main">
-    <mc:Choice Requires="p14">
+  <mc:AlternateContent xmlns:mc="http://schemas.openxmlformats.org/markup-compatibility/2006">
+    <mc:Choice xmlns:p14="http://schemas.microsoft.com/office/powerpoint/2010/main" Requires="p14">
       <p:transition spd="slow" p14:dur="2000"/>
     </mc:Choice>
-    <mc:Fallback xmlns="">
+    <mc:Fallback>
       <p:transition spd="slow"/>
     </mc:Fallback>
   </mc:AlternateContent>
@@ -31440,7 +31439,7 @@
 </file>
 
 <file path=ppt/slides/slide49.xml><?xml version="1.0" encoding="utf-8"?>
-<p:sld xmlns:a="http://schemas.openxmlformats.org/drawingml/2006/main" xmlns:r="http://schemas.openxmlformats.org/officeDocument/2006/relationships" xmlns:p="http://schemas.openxmlformats.org/presentationml/2006/main" show="0">
+<p:sld xmlns:a="http://schemas.openxmlformats.org/drawingml/2006/main" xmlns:r="http://schemas.openxmlformats.org/officeDocument/2006/relationships" xmlns:p="http://schemas.openxmlformats.org/presentationml/2006/main">
   <p:cSld>
     <p:spTree>
       <p:nvGrpSpPr>
@@ -31739,11 +31738,11 @@
   <p:clrMapOvr>
     <a:masterClrMapping/>
   </p:clrMapOvr>
-  <mc:AlternateContent xmlns:mc="http://schemas.openxmlformats.org/markup-compatibility/2006" xmlns:p14="http://schemas.microsoft.com/office/powerpoint/2010/main">
-    <mc:Choice Requires="p14">
+  <mc:AlternateContent xmlns:mc="http://schemas.openxmlformats.org/markup-compatibility/2006">
+    <mc:Choice xmlns:p14="http://schemas.microsoft.com/office/powerpoint/2010/main" Requires="p14">
       <p:transition spd="slow" p14:dur="2000"/>
     </mc:Choice>
-    <mc:Fallback xmlns="">
+    <mc:Fallback>
       <p:transition spd="slow"/>
     </mc:Fallback>
   </mc:AlternateContent>
@@ -31758,7 +31757,7 @@
 </file>
 
 <file path=ppt/slides/slide5.xml><?xml version="1.0" encoding="utf-8"?>
-<p:sld xmlns:a="http://schemas.openxmlformats.org/drawingml/2006/main" xmlns:r="http://schemas.openxmlformats.org/officeDocument/2006/relationships" xmlns:p="http://schemas.openxmlformats.org/presentationml/2006/main" show="0">
+<p:sld xmlns:a="http://schemas.openxmlformats.org/drawingml/2006/main" xmlns:r="http://schemas.openxmlformats.org/officeDocument/2006/relationships" xmlns:p="http://schemas.openxmlformats.org/presentationml/2006/main">
   <p:cSld>
     <p:spTree>
       <p:nvGrpSpPr>
@@ -32209,11 +32208,11 @@
   <p:clrMapOvr>
     <a:masterClrMapping/>
   </p:clrMapOvr>
-  <mc:AlternateContent xmlns:mc="http://schemas.openxmlformats.org/markup-compatibility/2006" xmlns:p14="http://schemas.microsoft.com/office/powerpoint/2010/main">
-    <mc:Choice Requires="p14">
+  <mc:AlternateContent xmlns:mc="http://schemas.openxmlformats.org/markup-compatibility/2006">
+    <mc:Choice xmlns:p14="http://schemas.microsoft.com/office/powerpoint/2010/main" Requires="p14">
       <p:transition spd="slow" p14:dur="2000"/>
     </mc:Choice>
-    <mc:Fallback xmlns="">
+    <mc:Fallback>
       <p:transition spd="slow"/>
     </mc:Fallback>
   </mc:AlternateContent>
@@ -32228,7 +32227,7 @@
 </file>
 
 <file path=ppt/slides/slide50.xml><?xml version="1.0" encoding="utf-8"?>
-<p:sld xmlns:a="http://schemas.openxmlformats.org/drawingml/2006/main" xmlns:r="http://schemas.openxmlformats.org/officeDocument/2006/relationships" xmlns:p="http://schemas.openxmlformats.org/presentationml/2006/main" show="0">
+<p:sld xmlns:a="http://schemas.openxmlformats.org/drawingml/2006/main" xmlns:r="http://schemas.openxmlformats.org/officeDocument/2006/relationships" xmlns:p="http://schemas.openxmlformats.org/presentationml/2006/main">
   <p:cSld>
     <p:spTree>
       <p:nvGrpSpPr>
@@ -32570,11 +32569,11 @@
   <p:clrMapOvr>
     <a:masterClrMapping/>
   </p:clrMapOvr>
-  <mc:AlternateContent xmlns:mc="http://schemas.openxmlformats.org/markup-compatibility/2006" xmlns:p14="http://schemas.microsoft.com/office/powerpoint/2010/main">
-    <mc:Choice Requires="p14">
+  <mc:AlternateContent xmlns:mc="http://schemas.openxmlformats.org/markup-compatibility/2006">
+    <mc:Choice xmlns:p14="http://schemas.microsoft.com/office/powerpoint/2010/main" Requires="p14">
       <p:transition spd="slow" p14:dur="2000"/>
     </mc:Choice>
-    <mc:Fallback xmlns="">
+    <mc:Fallback>
       <p:transition spd="slow"/>
     </mc:Fallback>
   </mc:AlternateContent>
@@ -32589,7 +32588,7 @@
 </file>
 
 <file path=ppt/slides/slide51.xml><?xml version="1.0" encoding="utf-8"?>
-<p:sld xmlns:a="http://schemas.openxmlformats.org/drawingml/2006/main" xmlns:r="http://schemas.openxmlformats.org/officeDocument/2006/relationships" xmlns:p="http://schemas.openxmlformats.org/presentationml/2006/main" show="0">
+<p:sld xmlns:a="http://schemas.openxmlformats.org/drawingml/2006/main" xmlns:r="http://schemas.openxmlformats.org/officeDocument/2006/relationships" xmlns:p="http://schemas.openxmlformats.org/presentationml/2006/main">
   <p:cSld>
     <p:spTree>
       <p:nvGrpSpPr>
@@ -32765,11 +32764,11 @@
   <p:clrMapOvr>
     <a:masterClrMapping/>
   </p:clrMapOvr>
-  <mc:AlternateContent xmlns:mc="http://schemas.openxmlformats.org/markup-compatibility/2006" xmlns:p14="http://schemas.microsoft.com/office/powerpoint/2010/main">
-    <mc:Choice Requires="p14">
+  <mc:AlternateContent xmlns:mc="http://schemas.openxmlformats.org/markup-compatibility/2006">
+    <mc:Choice xmlns:p14="http://schemas.microsoft.com/office/powerpoint/2010/main" Requires="p14">
       <p:transition spd="slow" p14:dur="2000"/>
     </mc:Choice>
-    <mc:Fallback xmlns="">
+    <mc:Fallback>
       <p:transition spd="slow"/>
     </mc:Fallback>
   </mc:AlternateContent>
@@ -32784,7 +32783,7 @@
 </file>
 
 <file path=ppt/slides/slide52.xml><?xml version="1.0" encoding="utf-8"?>
-<p:sld xmlns:a="http://schemas.openxmlformats.org/drawingml/2006/main" xmlns:r="http://schemas.openxmlformats.org/officeDocument/2006/relationships" xmlns:p="http://schemas.openxmlformats.org/presentationml/2006/main" show="0">
+<p:sld xmlns:a="http://schemas.openxmlformats.org/drawingml/2006/main" xmlns:r="http://schemas.openxmlformats.org/officeDocument/2006/relationships" xmlns:p="http://schemas.openxmlformats.org/presentationml/2006/main">
   <p:cSld>
     <p:spTree>
       <p:nvGrpSpPr>
@@ -33393,11 +33392,11 @@
   <p:clrMapOvr>
     <a:masterClrMapping/>
   </p:clrMapOvr>
-  <mc:AlternateContent xmlns:mc="http://schemas.openxmlformats.org/markup-compatibility/2006" xmlns:p14="http://schemas.microsoft.com/office/powerpoint/2010/main">
-    <mc:Choice Requires="p14">
+  <mc:AlternateContent xmlns:mc="http://schemas.openxmlformats.org/markup-compatibility/2006">
+    <mc:Choice xmlns:p14="http://schemas.microsoft.com/office/powerpoint/2010/main" Requires="p14">
       <p:transition spd="slow" p14:dur="2000"/>
     </mc:Choice>
-    <mc:Fallback xmlns="">
+    <mc:Fallback>
       <p:transition spd="slow"/>
     </mc:Fallback>
   </mc:AlternateContent>
@@ -33412,7 +33411,7 @@
 </file>
 
 <file path=ppt/slides/slide53.xml><?xml version="1.0" encoding="utf-8"?>
-<p:sld xmlns:a="http://schemas.openxmlformats.org/drawingml/2006/main" xmlns:r="http://schemas.openxmlformats.org/officeDocument/2006/relationships" xmlns:p="http://schemas.openxmlformats.org/presentationml/2006/main" show="0">
+<p:sld xmlns:a="http://schemas.openxmlformats.org/drawingml/2006/main" xmlns:r="http://schemas.openxmlformats.org/officeDocument/2006/relationships" xmlns:p="http://schemas.openxmlformats.org/presentationml/2006/main">
   <p:cSld>
     <p:spTree>
       <p:nvGrpSpPr>
@@ -33672,11 +33671,11 @@
   <p:clrMapOvr>
     <a:masterClrMapping/>
   </p:clrMapOvr>
-  <mc:AlternateContent xmlns:mc="http://schemas.openxmlformats.org/markup-compatibility/2006" xmlns:p14="http://schemas.microsoft.com/office/powerpoint/2010/main">
-    <mc:Choice Requires="p14">
+  <mc:AlternateContent xmlns:mc="http://schemas.openxmlformats.org/markup-compatibility/2006">
+    <mc:Choice xmlns:p14="http://schemas.microsoft.com/office/powerpoint/2010/main" Requires="p14">
       <p:transition spd="slow" p14:dur="2000"/>
     </mc:Choice>
-    <mc:Fallback xmlns="">
+    <mc:Fallback>
       <p:transition spd="slow"/>
     </mc:Fallback>
   </mc:AlternateContent>
@@ -33691,7 +33690,7 @@
 </file>
 
 <file path=ppt/slides/slide54.xml><?xml version="1.0" encoding="utf-8"?>
-<p:sld xmlns:a="http://schemas.openxmlformats.org/drawingml/2006/main" xmlns:r="http://schemas.openxmlformats.org/officeDocument/2006/relationships" xmlns:p="http://schemas.openxmlformats.org/presentationml/2006/main" show="0">
+<p:sld xmlns:a="http://schemas.openxmlformats.org/drawingml/2006/main" xmlns:r="http://schemas.openxmlformats.org/officeDocument/2006/relationships" xmlns:p="http://schemas.openxmlformats.org/presentationml/2006/main">
   <p:cSld>
     <p:spTree>
       <p:nvGrpSpPr>
@@ -34276,11 +34275,11 @@
   <p:clrMapOvr>
     <a:masterClrMapping/>
   </p:clrMapOvr>
-  <mc:AlternateContent xmlns:mc="http://schemas.openxmlformats.org/markup-compatibility/2006" xmlns:p14="http://schemas.microsoft.com/office/powerpoint/2010/main">
-    <mc:Choice Requires="p14">
+  <mc:AlternateContent xmlns:mc="http://schemas.openxmlformats.org/markup-compatibility/2006">
+    <mc:Choice xmlns:p14="http://schemas.microsoft.com/office/powerpoint/2010/main" Requires="p14">
       <p:transition spd="slow" p14:dur="2000"/>
     </mc:Choice>
-    <mc:Fallback xmlns="">
+    <mc:Fallback>
       <p:transition spd="slow"/>
     </mc:Fallback>
   </mc:AlternateContent>
@@ -34433,7 +34432,7 @@
 </file>
 
 <file path=ppt/slides/slide56.xml><?xml version="1.0" encoding="utf-8"?>
-<p:sld xmlns:a="http://schemas.openxmlformats.org/drawingml/2006/main" xmlns:r="http://schemas.openxmlformats.org/officeDocument/2006/relationships" xmlns:p="http://schemas.openxmlformats.org/presentationml/2006/main" show="0">
+<p:sld xmlns:a="http://schemas.openxmlformats.org/drawingml/2006/main" xmlns:r="http://schemas.openxmlformats.org/officeDocument/2006/relationships" xmlns:p="http://schemas.openxmlformats.org/presentationml/2006/main">
   <p:cSld>
     <p:spTree>
       <p:nvGrpSpPr>
@@ -34651,11 +34650,11 @@
   <p:clrMapOvr>
     <a:masterClrMapping/>
   </p:clrMapOvr>
-  <mc:AlternateContent xmlns:mc="http://schemas.openxmlformats.org/markup-compatibility/2006" xmlns:p14="http://schemas.microsoft.com/office/powerpoint/2010/main">
-    <mc:Choice Requires="p14">
+  <mc:AlternateContent xmlns:mc="http://schemas.openxmlformats.org/markup-compatibility/2006">
+    <mc:Choice xmlns:p14="http://schemas.microsoft.com/office/powerpoint/2010/main" Requires="p14">
       <p:transition spd="slow" p14:dur="2000"/>
     </mc:Choice>
-    <mc:Fallback xmlns="">
+    <mc:Fallback>
       <p:transition spd="slow"/>
     </mc:Fallback>
   </mc:AlternateContent>
@@ -34670,7 +34669,7 @@
 </file>
 
 <file path=ppt/slides/slide57.xml><?xml version="1.0" encoding="utf-8"?>
-<p:sld xmlns:a="http://schemas.openxmlformats.org/drawingml/2006/main" xmlns:r="http://schemas.openxmlformats.org/officeDocument/2006/relationships" xmlns:p="http://schemas.openxmlformats.org/presentationml/2006/main" show="0">
+<p:sld xmlns:a="http://schemas.openxmlformats.org/drawingml/2006/main" xmlns:r="http://schemas.openxmlformats.org/officeDocument/2006/relationships" xmlns:p="http://schemas.openxmlformats.org/presentationml/2006/main">
   <p:cSld>
     <p:spTree>
       <p:nvGrpSpPr>
@@ -34845,11 +34844,11 @@
   <p:clrMapOvr>
     <a:masterClrMapping/>
   </p:clrMapOvr>
-  <mc:AlternateContent xmlns:mc="http://schemas.openxmlformats.org/markup-compatibility/2006" xmlns:p14="http://schemas.microsoft.com/office/powerpoint/2010/main">
-    <mc:Choice Requires="p14">
+  <mc:AlternateContent xmlns:mc="http://schemas.openxmlformats.org/markup-compatibility/2006">
+    <mc:Choice xmlns:p14="http://schemas.microsoft.com/office/powerpoint/2010/main" Requires="p14">
       <p:transition spd="slow" p14:dur="2000"/>
     </mc:Choice>
-    <mc:Fallback xmlns="">
+    <mc:Fallback>
       <p:transition spd="slow"/>
     </mc:Fallback>
   </mc:AlternateContent>
@@ -34864,7 +34863,7 @@
 </file>
 
 <file path=ppt/slides/slide58.xml><?xml version="1.0" encoding="utf-8"?>
-<p:sld xmlns:a="http://schemas.openxmlformats.org/drawingml/2006/main" xmlns:r="http://schemas.openxmlformats.org/officeDocument/2006/relationships" xmlns:p="http://schemas.openxmlformats.org/presentationml/2006/main" show="0">
+<p:sld xmlns:a="http://schemas.openxmlformats.org/drawingml/2006/main" xmlns:r="http://schemas.openxmlformats.org/officeDocument/2006/relationships" xmlns:p="http://schemas.openxmlformats.org/presentationml/2006/main">
   <p:cSld>
     <p:spTree>
       <p:nvGrpSpPr>
@@ -34936,11 +34935,11 @@
   <p:clrMapOvr>
     <a:masterClrMapping/>
   </p:clrMapOvr>
-  <mc:AlternateContent xmlns:mc="http://schemas.openxmlformats.org/markup-compatibility/2006" xmlns:p14="http://schemas.microsoft.com/office/powerpoint/2010/main">
-    <mc:Choice Requires="p14">
+  <mc:AlternateContent xmlns:mc="http://schemas.openxmlformats.org/markup-compatibility/2006">
+    <mc:Choice xmlns:p14="http://schemas.microsoft.com/office/powerpoint/2010/main" Requires="p14">
       <p:transition spd="slow" p14:dur="2000"/>
     </mc:Choice>
-    <mc:Fallback xmlns="">
+    <mc:Fallback>
       <p:transition spd="slow"/>
     </mc:Fallback>
   </mc:AlternateContent>
@@ -34955,7 +34954,7 @@
 </file>
 
 <file path=ppt/slides/slide59.xml><?xml version="1.0" encoding="utf-8"?>
-<p:sld xmlns:a="http://schemas.openxmlformats.org/drawingml/2006/main" xmlns:r="http://schemas.openxmlformats.org/officeDocument/2006/relationships" xmlns:p="http://schemas.openxmlformats.org/presentationml/2006/main" show="0">
+<p:sld xmlns:a="http://schemas.openxmlformats.org/drawingml/2006/main" xmlns:r="http://schemas.openxmlformats.org/officeDocument/2006/relationships" xmlns:p="http://schemas.openxmlformats.org/presentationml/2006/main">
   <p:cSld>
     <p:spTree>
       <p:nvGrpSpPr>
@@ -35060,11 +35059,11 @@
   <p:clrMapOvr>
     <a:masterClrMapping/>
   </p:clrMapOvr>
-  <mc:AlternateContent xmlns:mc="http://schemas.openxmlformats.org/markup-compatibility/2006" xmlns:p14="http://schemas.microsoft.com/office/powerpoint/2010/main">
-    <mc:Choice Requires="p14">
+  <mc:AlternateContent xmlns:mc="http://schemas.openxmlformats.org/markup-compatibility/2006">
+    <mc:Choice xmlns:p14="http://schemas.microsoft.com/office/powerpoint/2010/main" Requires="p14">
       <p:transition spd="slow" p14:dur="2000"/>
     </mc:Choice>
-    <mc:Fallback xmlns="">
+    <mc:Fallback>
       <p:transition spd="slow"/>
     </mc:Fallback>
   </mc:AlternateContent>
@@ -35079,7 +35078,7 @@
 </file>
 
 <file path=ppt/slides/slide6.xml><?xml version="1.0" encoding="utf-8"?>
-<p:sld xmlns:a="http://schemas.openxmlformats.org/drawingml/2006/main" xmlns:r="http://schemas.openxmlformats.org/officeDocument/2006/relationships" xmlns:p="http://schemas.openxmlformats.org/presentationml/2006/main" show="0">
+<p:sld xmlns:a="http://schemas.openxmlformats.org/drawingml/2006/main" xmlns:r="http://schemas.openxmlformats.org/officeDocument/2006/relationships" xmlns:p="http://schemas.openxmlformats.org/presentationml/2006/main">
   <p:cSld>
     <p:spTree>
       <p:nvGrpSpPr>
@@ -35346,11 +35345,11 @@
   <p:clrMapOvr>
     <a:masterClrMapping/>
   </p:clrMapOvr>
-  <mc:AlternateContent xmlns:mc="http://schemas.openxmlformats.org/markup-compatibility/2006" xmlns:p14="http://schemas.microsoft.com/office/powerpoint/2010/main">
-    <mc:Choice Requires="p14">
+  <mc:AlternateContent xmlns:mc="http://schemas.openxmlformats.org/markup-compatibility/2006">
+    <mc:Choice xmlns:p14="http://schemas.microsoft.com/office/powerpoint/2010/main" Requires="p14">
       <p:transition spd="slow" p14:dur="2000"/>
     </mc:Choice>
-    <mc:Fallback xmlns="">
+    <mc:Fallback>
       <p:transition spd="slow"/>
     </mc:Fallback>
   </mc:AlternateContent>
@@ -35365,7 +35364,7 @@
 </file>
 
 <file path=ppt/slides/slide60.xml><?xml version="1.0" encoding="utf-8"?>
-<p:sld xmlns:a="http://schemas.openxmlformats.org/drawingml/2006/main" xmlns:r="http://schemas.openxmlformats.org/officeDocument/2006/relationships" xmlns:p="http://schemas.openxmlformats.org/presentationml/2006/main" show="0">
+<p:sld xmlns:a="http://schemas.openxmlformats.org/drawingml/2006/main" xmlns:r="http://schemas.openxmlformats.org/officeDocument/2006/relationships" xmlns:p="http://schemas.openxmlformats.org/presentationml/2006/main">
   <p:cSld>
     <p:spTree>
       <p:nvGrpSpPr>
@@ -35482,11 +35481,11 @@
   <p:clrMapOvr>
     <a:masterClrMapping/>
   </p:clrMapOvr>
-  <mc:AlternateContent xmlns:mc="http://schemas.openxmlformats.org/markup-compatibility/2006" xmlns:p14="http://schemas.microsoft.com/office/powerpoint/2010/main">
-    <mc:Choice Requires="p14">
+  <mc:AlternateContent xmlns:mc="http://schemas.openxmlformats.org/markup-compatibility/2006">
+    <mc:Choice xmlns:p14="http://schemas.microsoft.com/office/powerpoint/2010/main" Requires="p14">
       <p:transition spd="slow" p14:dur="2000"/>
     </mc:Choice>
-    <mc:Fallback xmlns="">
+    <mc:Fallback>
       <p:transition spd="slow"/>
     </mc:Fallback>
   </mc:AlternateContent>
@@ -35501,7 +35500,7 @@
 </file>
 
 <file path=ppt/slides/slide61.xml><?xml version="1.0" encoding="utf-8"?>
-<p:sld xmlns:a="http://schemas.openxmlformats.org/drawingml/2006/main" xmlns:r="http://schemas.openxmlformats.org/officeDocument/2006/relationships" xmlns:p="http://schemas.openxmlformats.org/presentationml/2006/main" show="0">
+<p:sld xmlns:a="http://schemas.openxmlformats.org/drawingml/2006/main" xmlns:r="http://schemas.openxmlformats.org/officeDocument/2006/relationships" xmlns:p="http://schemas.openxmlformats.org/presentationml/2006/main">
   <p:cSld>
     <p:spTree>
       <p:nvGrpSpPr>
@@ -35569,11 +35568,11 @@
   <p:clrMapOvr>
     <a:masterClrMapping/>
   </p:clrMapOvr>
-  <mc:AlternateContent xmlns:mc="http://schemas.openxmlformats.org/markup-compatibility/2006" xmlns:p14="http://schemas.microsoft.com/office/powerpoint/2010/main">
-    <mc:Choice Requires="p14">
+  <mc:AlternateContent xmlns:mc="http://schemas.openxmlformats.org/markup-compatibility/2006">
+    <mc:Choice xmlns:p14="http://schemas.microsoft.com/office/powerpoint/2010/main" Requires="p14">
       <p:transition spd="slow" p14:dur="2000"/>
     </mc:Choice>
-    <mc:Fallback xmlns="">
+    <mc:Fallback>
       <p:transition spd="slow"/>
     </mc:Fallback>
   </mc:AlternateContent>
@@ -35588,7 +35587,7 @@
 </file>
 
 <file path=ppt/slides/slide62.xml><?xml version="1.0" encoding="utf-8"?>
-<p:sld xmlns:a="http://schemas.openxmlformats.org/drawingml/2006/main" xmlns:r="http://schemas.openxmlformats.org/officeDocument/2006/relationships" xmlns:p="http://schemas.openxmlformats.org/presentationml/2006/main" show="0">
+<p:sld xmlns:a="http://schemas.openxmlformats.org/drawingml/2006/main" xmlns:r="http://schemas.openxmlformats.org/officeDocument/2006/relationships" xmlns:p="http://schemas.openxmlformats.org/presentationml/2006/main">
   <p:cSld>
     <p:spTree>
       <p:nvGrpSpPr>
@@ -35708,11 +35707,11 @@
   <p:clrMapOvr>
     <a:masterClrMapping/>
   </p:clrMapOvr>
-  <mc:AlternateContent xmlns:mc="http://schemas.openxmlformats.org/markup-compatibility/2006" xmlns:p14="http://schemas.microsoft.com/office/powerpoint/2010/main">
-    <mc:Choice Requires="p14">
+  <mc:AlternateContent xmlns:mc="http://schemas.openxmlformats.org/markup-compatibility/2006">
+    <mc:Choice xmlns:p14="http://schemas.microsoft.com/office/powerpoint/2010/main" Requires="p14">
       <p:transition spd="slow" p14:dur="2000"/>
     </mc:Choice>
-    <mc:Fallback xmlns="">
+    <mc:Fallback>
       <p:transition spd="slow"/>
     </mc:Fallback>
   </mc:AlternateContent>
@@ -35727,7 +35726,7 @@
 </file>
 
 <file path=ppt/slides/slide63.xml><?xml version="1.0" encoding="utf-8"?>
-<p:sld xmlns:a="http://schemas.openxmlformats.org/drawingml/2006/main" xmlns:r="http://schemas.openxmlformats.org/officeDocument/2006/relationships" xmlns:p="http://schemas.openxmlformats.org/presentationml/2006/main" show="0">
+<p:sld xmlns:a="http://schemas.openxmlformats.org/drawingml/2006/main" xmlns:r="http://schemas.openxmlformats.org/officeDocument/2006/relationships" xmlns:p="http://schemas.openxmlformats.org/presentationml/2006/main">
   <p:cSld>
     <p:spTree>
       <p:nvGrpSpPr>
@@ -35822,11 +35821,11 @@
   <p:clrMapOvr>
     <a:masterClrMapping/>
   </p:clrMapOvr>
-  <mc:AlternateContent xmlns:mc="http://schemas.openxmlformats.org/markup-compatibility/2006" xmlns:p14="http://schemas.microsoft.com/office/powerpoint/2010/main">
-    <mc:Choice Requires="p14">
+  <mc:AlternateContent xmlns:mc="http://schemas.openxmlformats.org/markup-compatibility/2006">
+    <mc:Choice xmlns:p14="http://schemas.microsoft.com/office/powerpoint/2010/main" Requires="p14">
       <p:transition spd="slow" p14:dur="2000"/>
     </mc:Choice>
-    <mc:Fallback xmlns="">
+    <mc:Fallback>
       <p:transition spd="slow"/>
     </mc:Fallback>
   </mc:AlternateContent>
@@ -35841,7 +35840,7 @@
 </file>
 
 <file path=ppt/slides/slide7.xml><?xml version="1.0" encoding="utf-8"?>
-<p:sld xmlns:a="http://schemas.openxmlformats.org/drawingml/2006/main" xmlns:r="http://schemas.openxmlformats.org/officeDocument/2006/relationships" xmlns:p="http://schemas.openxmlformats.org/presentationml/2006/main" show="0">
+<p:sld xmlns:a="http://schemas.openxmlformats.org/drawingml/2006/main" xmlns:r="http://schemas.openxmlformats.org/officeDocument/2006/relationships" xmlns:p="http://schemas.openxmlformats.org/presentationml/2006/main">
   <p:cSld>
     <p:spTree>
       <p:nvGrpSpPr>
@@ -35909,11 +35908,11 @@
   <p:clrMapOvr>
     <a:masterClrMapping/>
   </p:clrMapOvr>
-  <mc:AlternateContent xmlns:mc="http://schemas.openxmlformats.org/markup-compatibility/2006" xmlns:p14="http://schemas.microsoft.com/office/powerpoint/2010/main">
-    <mc:Choice Requires="p14">
+  <mc:AlternateContent xmlns:mc="http://schemas.openxmlformats.org/markup-compatibility/2006">
+    <mc:Choice xmlns:p14="http://schemas.microsoft.com/office/powerpoint/2010/main" Requires="p14">
       <p:transition spd="slow" p14:dur="2000"/>
     </mc:Choice>
-    <mc:Fallback xmlns="">
+    <mc:Fallback>
       <p:transition spd="slow"/>
     </mc:Fallback>
   </mc:AlternateContent>
@@ -35928,7 +35927,7 @@
 </file>
 
 <file path=ppt/slides/slide8.xml><?xml version="1.0" encoding="utf-8"?>
-<p:sld xmlns:a="http://schemas.openxmlformats.org/drawingml/2006/main" xmlns:r="http://schemas.openxmlformats.org/officeDocument/2006/relationships" xmlns:p="http://schemas.openxmlformats.org/presentationml/2006/main" show="0">
+<p:sld xmlns:a="http://schemas.openxmlformats.org/drawingml/2006/main" xmlns:r="http://schemas.openxmlformats.org/officeDocument/2006/relationships" xmlns:p="http://schemas.openxmlformats.org/presentationml/2006/main">
   <p:cSld>
     <p:spTree>
       <p:nvGrpSpPr>
@@ -36042,11 +36041,11 @@
   <p:clrMapOvr>
     <a:masterClrMapping/>
   </p:clrMapOvr>
-  <mc:AlternateContent xmlns:mc="http://schemas.openxmlformats.org/markup-compatibility/2006" xmlns:p14="http://schemas.microsoft.com/office/powerpoint/2010/main">
-    <mc:Choice Requires="p14">
+  <mc:AlternateContent xmlns:mc="http://schemas.openxmlformats.org/markup-compatibility/2006">
+    <mc:Choice xmlns:p14="http://schemas.microsoft.com/office/powerpoint/2010/main" Requires="p14">
       <p:transition spd="slow" p14:dur="2000"/>
     </mc:Choice>
-    <mc:Fallback xmlns="">
+    <mc:Fallback>
       <p:transition spd="slow"/>
     </mc:Fallback>
   </mc:AlternateContent>
@@ -36061,7 +36060,7 @@
 </file>
 
 <file path=ppt/slides/slide9.xml><?xml version="1.0" encoding="utf-8"?>
-<p:sld xmlns:a="http://schemas.openxmlformats.org/drawingml/2006/main" xmlns:r="http://schemas.openxmlformats.org/officeDocument/2006/relationships" xmlns:p="http://schemas.openxmlformats.org/presentationml/2006/main" show="0">
+<p:sld xmlns:a="http://schemas.openxmlformats.org/drawingml/2006/main" xmlns:r="http://schemas.openxmlformats.org/officeDocument/2006/relationships" xmlns:p="http://schemas.openxmlformats.org/presentationml/2006/main">
   <p:cSld>
     <p:spTree>
       <p:nvGrpSpPr>
@@ -36445,11 +36444,11 @@
   <p:clrMapOvr>
     <a:masterClrMapping/>
   </p:clrMapOvr>
-  <mc:AlternateContent xmlns:mc="http://schemas.openxmlformats.org/markup-compatibility/2006" xmlns:p14="http://schemas.microsoft.com/office/powerpoint/2010/main">
-    <mc:Choice Requires="p14">
+  <mc:AlternateContent xmlns:mc="http://schemas.openxmlformats.org/markup-compatibility/2006">
+    <mc:Choice xmlns:p14="http://schemas.microsoft.com/office/powerpoint/2010/main" Requires="p14">
       <p:transition spd="slow" p14:dur="2000"/>
     </mc:Choice>
-    <mc:Fallback xmlns="">
+    <mc:Fallback>
       <p:transition spd="slow"/>
     </mc:Fallback>
   </mc:AlternateContent>

</xml_diff>